<commit_message>
tried to add a default pic in populate but i cant run it. Removed docs + finished powerpoint
</commit_message>
<xml_diff>
--- a/Presentation.pptx
+++ b/Presentation.pptx
@@ -5,7 +5,7 @@
     <p:sldMasterId id="2147483699" r:id="rId1"/>
   </p:sldMasterIdLst>
   <p:notesMasterIdLst>
-    <p:notesMasterId r:id="rId8"/>
+    <p:notesMasterId r:id="rId16"/>
   </p:notesMasterIdLst>
   <p:sldIdLst>
     <p:sldId id="256" r:id="rId2"/>
@@ -14,6 +14,14 @@
     <p:sldId id="260" r:id="rId5"/>
     <p:sldId id="259" r:id="rId6"/>
     <p:sldId id="261" r:id="rId7"/>
+    <p:sldId id="262" r:id="rId8"/>
+    <p:sldId id="264" r:id="rId9"/>
+    <p:sldId id="265" r:id="rId10"/>
+    <p:sldId id="266" r:id="rId11"/>
+    <p:sldId id="267" r:id="rId12"/>
+    <p:sldId id="269" r:id="rId13"/>
+    <p:sldId id="271" r:id="rId14"/>
+    <p:sldId id="270" r:id="rId15"/>
   </p:sldIdLst>
   <p:sldSz cx="12192000" cy="6858000"/>
   <p:notesSz cx="6858000" cy="9144000"/>
@@ -112,6 +120,11 @@
       </a:defRPr>
     </a:lvl9pPr>
   </p:defaultTextStyle>
+  <p:extLst>
+    <p:ext uri="{EFAFB233-063F-42B5-8137-9DF3F51BA10A}">
+      <p15:sldGuideLst xmlns:p15="http://schemas.microsoft.com/office/powerpoint/2012/main"/>
+    </p:ext>
+  </p:extLst>
 </p:presentation>
 </file>
 
@@ -557,6 +570,98 @@
 </p:notes>
 </file>
 
+<file path=ppt/notesSlides/notesSlide10.xml><?xml version="1.0" encoding="utf-8"?>
+<p:notes xmlns:a="http://schemas.openxmlformats.org/drawingml/2006/main" xmlns:r="http://schemas.openxmlformats.org/officeDocument/2006/relationships" xmlns:p="http://schemas.openxmlformats.org/presentationml/2006/main">
+  <p:cSld>
+    <p:spTree>
+      <p:nvGrpSpPr>
+        <p:cNvPr id="1" name=""/>
+        <p:cNvGrpSpPr/>
+        <p:nvPr/>
+      </p:nvGrpSpPr>
+      <p:grpSpPr>
+        <a:xfrm>
+          <a:off x="0" y="0"/>
+          <a:ext cx="0" cy="0"/>
+          <a:chOff x="0" y="0"/>
+          <a:chExt cx="0" cy="0"/>
+        </a:xfrm>
+      </p:grpSpPr>
+      <p:sp>
+        <p:nvSpPr>
+          <p:cNvPr id="2" name="Slide Image Placeholder 1"/>
+          <p:cNvSpPr>
+            <a:spLocks noGrp="1" noRot="1" noChangeAspect="1"/>
+          </p:cNvSpPr>
+          <p:nvPr>
+            <p:ph type="sldImg"/>
+          </p:nvPr>
+        </p:nvSpPr>
+        <p:spPr/>
+      </p:sp>
+      <p:sp>
+        <p:nvSpPr>
+          <p:cNvPr id="3" name="Notes Placeholder 2"/>
+          <p:cNvSpPr>
+            <a:spLocks noGrp="1"/>
+          </p:cNvSpPr>
+          <p:nvPr>
+            <p:ph type="body" idx="1"/>
+          </p:nvPr>
+        </p:nvSpPr>
+        <p:spPr/>
+        <p:txBody>
+          <a:bodyPr/>
+          <a:lstStyle/>
+          <a:p>
+            <a:r>
+              <a:rPr lang="en-GB" dirty="0" err="1"/>
+              <a:t>Sfsdfsdfsd</a:t>
+            </a:r>
+            <a:r>
+              <a:rPr lang="en-GB" dirty="0"/>
+              <a:t> </a:t>
+            </a:r>
+            <a:endParaRPr lang="en-CY" dirty="0"/>
+          </a:p>
+        </p:txBody>
+      </p:sp>
+      <p:sp>
+        <p:nvSpPr>
+          <p:cNvPr id="4" name="Slide Number Placeholder 3"/>
+          <p:cNvSpPr>
+            <a:spLocks noGrp="1"/>
+          </p:cNvSpPr>
+          <p:nvPr>
+            <p:ph type="sldNum" sz="quarter" idx="5"/>
+          </p:nvPr>
+        </p:nvSpPr>
+        <p:spPr/>
+        <p:txBody>
+          <a:bodyPr/>
+          <a:lstStyle/>
+          <a:p>
+            <a:fld id="{2BD95660-8E7B-4493-B4B2-11817B0CC4A8}" type="slidenum">
+              <a:rPr lang="en-CY" smtClean="0"/>
+              <a:t>14</a:t>
+            </a:fld>
+            <a:endParaRPr lang="en-CY"/>
+          </a:p>
+        </p:txBody>
+      </p:sp>
+    </p:spTree>
+    <p:extLst>
+      <p:ext uri="{BB962C8B-B14F-4D97-AF65-F5344CB8AC3E}">
+        <p14:creationId xmlns:p14="http://schemas.microsoft.com/office/powerpoint/2010/main" val="2237846406"/>
+      </p:ext>
+    </p:extLst>
+  </p:cSld>
+  <p:clrMapOvr>
+    <a:masterClrMapping/>
+  </p:clrMapOvr>
+</p:notes>
+</file>
+
 <file path=ppt/notesSlides/notesSlide2.xml><?xml version="1.0" encoding="utf-8"?>
 <p:notes xmlns:a="http://schemas.openxmlformats.org/drawingml/2006/main" xmlns:r="http://schemas.openxmlformats.org/officeDocument/2006/relationships" xmlns:p="http://schemas.openxmlformats.org/presentationml/2006/main">
   <p:cSld>
@@ -640,6 +745,650 @@
     <p:extLst>
       <p:ext uri="{BB962C8B-B14F-4D97-AF65-F5344CB8AC3E}">
         <p14:creationId xmlns:p14="http://schemas.microsoft.com/office/powerpoint/2010/main" val="3227342555"/>
+      </p:ext>
+    </p:extLst>
+  </p:cSld>
+  <p:clrMapOvr>
+    <a:masterClrMapping/>
+  </p:clrMapOvr>
+</p:notes>
+</file>
+
+<file path=ppt/notesSlides/notesSlide3.xml><?xml version="1.0" encoding="utf-8"?>
+<p:notes xmlns:a="http://schemas.openxmlformats.org/drawingml/2006/main" xmlns:r="http://schemas.openxmlformats.org/officeDocument/2006/relationships" xmlns:p="http://schemas.openxmlformats.org/presentationml/2006/main">
+  <p:cSld>
+    <p:spTree>
+      <p:nvGrpSpPr>
+        <p:cNvPr id="1" name=""/>
+        <p:cNvGrpSpPr/>
+        <p:nvPr/>
+      </p:nvGrpSpPr>
+      <p:grpSpPr>
+        <a:xfrm>
+          <a:off x="0" y="0"/>
+          <a:ext cx="0" cy="0"/>
+          <a:chOff x="0" y="0"/>
+          <a:chExt cx="0" cy="0"/>
+        </a:xfrm>
+      </p:grpSpPr>
+      <p:sp>
+        <p:nvSpPr>
+          <p:cNvPr id="2" name="Slide Image Placeholder 1"/>
+          <p:cNvSpPr>
+            <a:spLocks noGrp="1" noRot="1" noChangeAspect="1"/>
+          </p:cNvSpPr>
+          <p:nvPr>
+            <p:ph type="sldImg"/>
+          </p:nvPr>
+        </p:nvSpPr>
+        <p:spPr/>
+      </p:sp>
+      <p:sp>
+        <p:nvSpPr>
+          <p:cNvPr id="3" name="Notes Placeholder 2"/>
+          <p:cNvSpPr>
+            <a:spLocks noGrp="1"/>
+          </p:cNvSpPr>
+          <p:nvPr>
+            <p:ph type="body" idx="1"/>
+          </p:nvPr>
+        </p:nvSpPr>
+        <p:spPr/>
+        <p:txBody>
+          <a:bodyPr/>
+          <a:lstStyle/>
+          <a:p>
+            <a:r>
+              <a:rPr lang="en-GB" dirty="0" err="1"/>
+              <a:t>Sfsdfsdfsd</a:t>
+            </a:r>
+            <a:r>
+              <a:rPr lang="en-GB" dirty="0"/>
+              <a:t> </a:t>
+            </a:r>
+            <a:endParaRPr lang="en-CY" dirty="0"/>
+          </a:p>
+        </p:txBody>
+      </p:sp>
+      <p:sp>
+        <p:nvSpPr>
+          <p:cNvPr id="4" name="Slide Number Placeholder 3"/>
+          <p:cNvSpPr>
+            <a:spLocks noGrp="1"/>
+          </p:cNvSpPr>
+          <p:nvPr>
+            <p:ph type="sldNum" sz="quarter" idx="5"/>
+          </p:nvPr>
+        </p:nvSpPr>
+        <p:spPr/>
+        <p:txBody>
+          <a:bodyPr/>
+          <a:lstStyle/>
+          <a:p>
+            <a:fld id="{2BD95660-8E7B-4493-B4B2-11817B0CC4A8}" type="slidenum">
+              <a:rPr lang="en-CY" smtClean="0"/>
+              <a:t>7</a:t>
+            </a:fld>
+            <a:endParaRPr lang="en-CY"/>
+          </a:p>
+        </p:txBody>
+      </p:sp>
+    </p:spTree>
+    <p:extLst>
+      <p:ext uri="{BB962C8B-B14F-4D97-AF65-F5344CB8AC3E}">
+        <p14:creationId xmlns:p14="http://schemas.microsoft.com/office/powerpoint/2010/main" val="2346182270"/>
+      </p:ext>
+    </p:extLst>
+  </p:cSld>
+  <p:clrMapOvr>
+    <a:masterClrMapping/>
+  </p:clrMapOvr>
+</p:notes>
+</file>
+
+<file path=ppt/notesSlides/notesSlide4.xml><?xml version="1.0" encoding="utf-8"?>
+<p:notes xmlns:a="http://schemas.openxmlformats.org/drawingml/2006/main" xmlns:r="http://schemas.openxmlformats.org/officeDocument/2006/relationships" xmlns:p="http://schemas.openxmlformats.org/presentationml/2006/main">
+  <p:cSld>
+    <p:spTree>
+      <p:nvGrpSpPr>
+        <p:cNvPr id="1" name=""/>
+        <p:cNvGrpSpPr/>
+        <p:nvPr/>
+      </p:nvGrpSpPr>
+      <p:grpSpPr>
+        <a:xfrm>
+          <a:off x="0" y="0"/>
+          <a:ext cx="0" cy="0"/>
+          <a:chOff x="0" y="0"/>
+          <a:chExt cx="0" cy="0"/>
+        </a:xfrm>
+      </p:grpSpPr>
+      <p:sp>
+        <p:nvSpPr>
+          <p:cNvPr id="2" name="Slide Image Placeholder 1"/>
+          <p:cNvSpPr>
+            <a:spLocks noGrp="1" noRot="1" noChangeAspect="1"/>
+          </p:cNvSpPr>
+          <p:nvPr>
+            <p:ph type="sldImg"/>
+          </p:nvPr>
+        </p:nvSpPr>
+        <p:spPr/>
+      </p:sp>
+      <p:sp>
+        <p:nvSpPr>
+          <p:cNvPr id="3" name="Notes Placeholder 2"/>
+          <p:cNvSpPr>
+            <a:spLocks noGrp="1"/>
+          </p:cNvSpPr>
+          <p:nvPr>
+            <p:ph type="body" idx="1"/>
+          </p:nvPr>
+        </p:nvSpPr>
+        <p:spPr/>
+        <p:txBody>
+          <a:bodyPr/>
+          <a:lstStyle/>
+          <a:p>
+            <a:r>
+              <a:rPr lang="en-GB" dirty="0" err="1"/>
+              <a:t>Sfsdfsdfsd</a:t>
+            </a:r>
+            <a:r>
+              <a:rPr lang="en-GB" dirty="0"/>
+              <a:t> </a:t>
+            </a:r>
+            <a:endParaRPr lang="en-CY" dirty="0"/>
+          </a:p>
+        </p:txBody>
+      </p:sp>
+      <p:sp>
+        <p:nvSpPr>
+          <p:cNvPr id="4" name="Slide Number Placeholder 3"/>
+          <p:cNvSpPr>
+            <a:spLocks noGrp="1"/>
+          </p:cNvSpPr>
+          <p:nvPr>
+            <p:ph type="sldNum" sz="quarter" idx="5"/>
+          </p:nvPr>
+        </p:nvSpPr>
+        <p:spPr/>
+        <p:txBody>
+          <a:bodyPr/>
+          <a:lstStyle/>
+          <a:p>
+            <a:fld id="{2BD95660-8E7B-4493-B4B2-11817B0CC4A8}" type="slidenum">
+              <a:rPr lang="en-CY" smtClean="0"/>
+              <a:t>8</a:t>
+            </a:fld>
+            <a:endParaRPr lang="en-CY"/>
+          </a:p>
+        </p:txBody>
+      </p:sp>
+    </p:spTree>
+    <p:extLst>
+      <p:ext uri="{BB962C8B-B14F-4D97-AF65-F5344CB8AC3E}">
+        <p14:creationId xmlns:p14="http://schemas.microsoft.com/office/powerpoint/2010/main" val="3138887629"/>
+      </p:ext>
+    </p:extLst>
+  </p:cSld>
+  <p:clrMapOvr>
+    <a:masterClrMapping/>
+  </p:clrMapOvr>
+</p:notes>
+</file>
+
+<file path=ppt/notesSlides/notesSlide5.xml><?xml version="1.0" encoding="utf-8"?>
+<p:notes xmlns:a="http://schemas.openxmlformats.org/drawingml/2006/main" xmlns:r="http://schemas.openxmlformats.org/officeDocument/2006/relationships" xmlns:p="http://schemas.openxmlformats.org/presentationml/2006/main">
+  <p:cSld>
+    <p:spTree>
+      <p:nvGrpSpPr>
+        <p:cNvPr id="1" name=""/>
+        <p:cNvGrpSpPr/>
+        <p:nvPr/>
+      </p:nvGrpSpPr>
+      <p:grpSpPr>
+        <a:xfrm>
+          <a:off x="0" y="0"/>
+          <a:ext cx="0" cy="0"/>
+          <a:chOff x="0" y="0"/>
+          <a:chExt cx="0" cy="0"/>
+        </a:xfrm>
+      </p:grpSpPr>
+      <p:sp>
+        <p:nvSpPr>
+          <p:cNvPr id="2" name="Slide Image Placeholder 1"/>
+          <p:cNvSpPr>
+            <a:spLocks noGrp="1" noRot="1" noChangeAspect="1"/>
+          </p:cNvSpPr>
+          <p:nvPr>
+            <p:ph type="sldImg"/>
+          </p:nvPr>
+        </p:nvSpPr>
+        <p:spPr/>
+      </p:sp>
+      <p:sp>
+        <p:nvSpPr>
+          <p:cNvPr id="3" name="Notes Placeholder 2"/>
+          <p:cNvSpPr>
+            <a:spLocks noGrp="1"/>
+          </p:cNvSpPr>
+          <p:nvPr>
+            <p:ph type="body" idx="1"/>
+          </p:nvPr>
+        </p:nvSpPr>
+        <p:spPr/>
+        <p:txBody>
+          <a:bodyPr/>
+          <a:lstStyle/>
+          <a:p>
+            <a:r>
+              <a:rPr lang="en-GB" dirty="0" err="1"/>
+              <a:t>Sfsdfsdfsd</a:t>
+            </a:r>
+            <a:r>
+              <a:rPr lang="en-GB" dirty="0"/>
+              <a:t> </a:t>
+            </a:r>
+            <a:endParaRPr lang="en-CY" dirty="0"/>
+          </a:p>
+        </p:txBody>
+      </p:sp>
+      <p:sp>
+        <p:nvSpPr>
+          <p:cNvPr id="4" name="Slide Number Placeholder 3"/>
+          <p:cNvSpPr>
+            <a:spLocks noGrp="1"/>
+          </p:cNvSpPr>
+          <p:nvPr>
+            <p:ph type="sldNum" sz="quarter" idx="5"/>
+          </p:nvPr>
+        </p:nvSpPr>
+        <p:spPr/>
+        <p:txBody>
+          <a:bodyPr/>
+          <a:lstStyle/>
+          <a:p>
+            <a:fld id="{2BD95660-8E7B-4493-B4B2-11817B0CC4A8}" type="slidenum">
+              <a:rPr lang="en-CY" smtClean="0"/>
+              <a:t>9</a:t>
+            </a:fld>
+            <a:endParaRPr lang="en-CY"/>
+          </a:p>
+        </p:txBody>
+      </p:sp>
+    </p:spTree>
+    <p:extLst>
+      <p:ext uri="{BB962C8B-B14F-4D97-AF65-F5344CB8AC3E}">
+        <p14:creationId xmlns:p14="http://schemas.microsoft.com/office/powerpoint/2010/main" val="3800686823"/>
+      </p:ext>
+    </p:extLst>
+  </p:cSld>
+  <p:clrMapOvr>
+    <a:masterClrMapping/>
+  </p:clrMapOvr>
+</p:notes>
+</file>
+
+<file path=ppt/notesSlides/notesSlide6.xml><?xml version="1.0" encoding="utf-8"?>
+<p:notes xmlns:a="http://schemas.openxmlformats.org/drawingml/2006/main" xmlns:r="http://schemas.openxmlformats.org/officeDocument/2006/relationships" xmlns:p="http://schemas.openxmlformats.org/presentationml/2006/main">
+  <p:cSld>
+    <p:spTree>
+      <p:nvGrpSpPr>
+        <p:cNvPr id="1" name=""/>
+        <p:cNvGrpSpPr/>
+        <p:nvPr/>
+      </p:nvGrpSpPr>
+      <p:grpSpPr>
+        <a:xfrm>
+          <a:off x="0" y="0"/>
+          <a:ext cx="0" cy="0"/>
+          <a:chOff x="0" y="0"/>
+          <a:chExt cx="0" cy="0"/>
+        </a:xfrm>
+      </p:grpSpPr>
+      <p:sp>
+        <p:nvSpPr>
+          <p:cNvPr id="2" name="Slide Image Placeholder 1"/>
+          <p:cNvSpPr>
+            <a:spLocks noGrp="1" noRot="1" noChangeAspect="1"/>
+          </p:cNvSpPr>
+          <p:nvPr>
+            <p:ph type="sldImg"/>
+          </p:nvPr>
+        </p:nvSpPr>
+        <p:spPr/>
+      </p:sp>
+      <p:sp>
+        <p:nvSpPr>
+          <p:cNvPr id="3" name="Notes Placeholder 2"/>
+          <p:cNvSpPr>
+            <a:spLocks noGrp="1"/>
+          </p:cNvSpPr>
+          <p:nvPr>
+            <p:ph type="body" idx="1"/>
+          </p:nvPr>
+        </p:nvSpPr>
+        <p:spPr/>
+        <p:txBody>
+          <a:bodyPr/>
+          <a:lstStyle/>
+          <a:p>
+            <a:r>
+              <a:rPr lang="en-GB" dirty="0" err="1"/>
+              <a:t>Sfsdfsdfsd</a:t>
+            </a:r>
+            <a:r>
+              <a:rPr lang="en-GB" dirty="0"/>
+              <a:t> </a:t>
+            </a:r>
+            <a:endParaRPr lang="en-CY" dirty="0"/>
+          </a:p>
+        </p:txBody>
+      </p:sp>
+      <p:sp>
+        <p:nvSpPr>
+          <p:cNvPr id="4" name="Slide Number Placeholder 3"/>
+          <p:cNvSpPr>
+            <a:spLocks noGrp="1"/>
+          </p:cNvSpPr>
+          <p:nvPr>
+            <p:ph type="sldNum" sz="quarter" idx="5"/>
+          </p:nvPr>
+        </p:nvSpPr>
+        <p:spPr/>
+        <p:txBody>
+          <a:bodyPr/>
+          <a:lstStyle/>
+          <a:p>
+            <a:fld id="{2BD95660-8E7B-4493-B4B2-11817B0CC4A8}" type="slidenum">
+              <a:rPr lang="en-CY" smtClean="0"/>
+              <a:t>10</a:t>
+            </a:fld>
+            <a:endParaRPr lang="en-CY"/>
+          </a:p>
+        </p:txBody>
+      </p:sp>
+    </p:spTree>
+    <p:extLst>
+      <p:ext uri="{BB962C8B-B14F-4D97-AF65-F5344CB8AC3E}">
+        <p14:creationId xmlns:p14="http://schemas.microsoft.com/office/powerpoint/2010/main" val="485321291"/>
+      </p:ext>
+    </p:extLst>
+  </p:cSld>
+  <p:clrMapOvr>
+    <a:masterClrMapping/>
+  </p:clrMapOvr>
+</p:notes>
+</file>
+
+<file path=ppt/notesSlides/notesSlide7.xml><?xml version="1.0" encoding="utf-8"?>
+<p:notes xmlns:a="http://schemas.openxmlformats.org/drawingml/2006/main" xmlns:r="http://schemas.openxmlformats.org/officeDocument/2006/relationships" xmlns:p="http://schemas.openxmlformats.org/presentationml/2006/main">
+  <p:cSld>
+    <p:spTree>
+      <p:nvGrpSpPr>
+        <p:cNvPr id="1" name=""/>
+        <p:cNvGrpSpPr/>
+        <p:nvPr/>
+      </p:nvGrpSpPr>
+      <p:grpSpPr>
+        <a:xfrm>
+          <a:off x="0" y="0"/>
+          <a:ext cx="0" cy="0"/>
+          <a:chOff x="0" y="0"/>
+          <a:chExt cx="0" cy="0"/>
+        </a:xfrm>
+      </p:grpSpPr>
+      <p:sp>
+        <p:nvSpPr>
+          <p:cNvPr id="2" name="Slide Image Placeholder 1"/>
+          <p:cNvSpPr>
+            <a:spLocks noGrp="1" noRot="1" noChangeAspect="1"/>
+          </p:cNvSpPr>
+          <p:nvPr>
+            <p:ph type="sldImg"/>
+          </p:nvPr>
+        </p:nvSpPr>
+        <p:spPr/>
+      </p:sp>
+      <p:sp>
+        <p:nvSpPr>
+          <p:cNvPr id="3" name="Notes Placeholder 2"/>
+          <p:cNvSpPr>
+            <a:spLocks noGrp="1"/>
+          </p:cNvSpPr>
+          <p:nvPr>
+            <p:ph type="body" idx="1"/>
+          </p:nvPr>
+        </p:nvSpPr>
+        <p:spPr/>
+        <p:txBody>
+          <a:bodyPr/>
+          <a:lstStyle/>
+          <a:p>
+            <a:r>
+              <a:rPr lang="en-GB" dirty="0" err="1"/>
+              <a:t>Sfsdfsdfsd</a:t>
+            </a:r>
+            <a:r>
+              <a:rPr lang="en-GB" dirty="0"/>
+              <a:t> </a:t>
+            </a:r>
+            <a:endParaRPr lang="en-CY" dirty="0"/>
+          </a:p>
+        </p:txBody>
+      </p:sp>
+      <p:sp>
+        <p:nvSpPr>
+          <p:cNvPr id="4" name="Slide Number Placeholder 3"/>
+          <p:cNvSpPr>
+            <a:spLocks noGrp="1"/>
+          </p:cNvSpPr>
+          <p:nvPr>
+            <p:ph type="sldNum" sz="quarter" idx="5"/>
+          </p:nvPr>
+        </p:nvSpPr>
+        <p:spPr/>
+        <p:txBody>
+          <a:bodyPr/>
+          <a:lstStyle/>
+          <a:p>
+            <a:fld id="{2BD95660-8E7B-4493-B4B2-11817B0CC4A8}" type="slidenum">
+              <a:rPr lang="en-CY" smtClean="0"/>
+              <a:t>11</a:t>
+            </a:fld>
+            <a:endParaRPr lang="en-CY"/>
+          </a:p>
+        </p:txBody>
+      </p:sp>
+    </p:spTree>
+    <p:extLst>
+      <p:ext uri="{BB962C8B-B14F-4D97-AF65-F5344CB8AC3E}">
+        <p14:creationId xmlns:p14="http://schemas.microsoft.com/office/powerpoint/2010/main" val="3486414923"/>
+      </p:ext>
+    </p:extLst>
+  </p:cSld>
+  <p:clrMapOvr>
+    <a:masterClrMapping/>
+  </p:clrMapOvr>
+</p:notes>
+</file>
+
+<file path=ppt/notesSlides/notesSlide8.xml><?xml version="1.0" encoding="utf-8"?>
+<p:notes xmlns:a="http://schemas.openxmlformats.org/drawingml/2006/main" xmlns:r="http://schemas.openxmlformats.org/officeDocument/2006/relationships" xmlns:p="http://schemas.openxmlformats.org/presentationml/2006/main">
+  <p:cSld>
+    <p:spTree>
+      <p:nvGrpSpPr>
+        <p:cNvPr id="1" name=""/>
+        <p:cNvGrpSpPr/>
+        <p:nvPr/>
+      </p:nvGrpSpPr>
+      <p:grpSpPr>
+        <a:xfrm>
+          <a:off x="0" y="0"/>
+          <a:ext cx="0" cy="0"/>
+          <a:chOff x="0" y="0"/>
+          <a:chExt cx="0" cy="0"/>
+        </a:xfrm>
+      </p:grpSpPr>
+      <p:sp>
+        <p:nvSpPr>
+          <p:cNvPr id="2" name="Slide Image Placeholder 1"/>
+          <p:cNvSpPr>
+            <a:spLocks noGrp="1" noRot="1" noChangeAspect="1"/>
+          </p:cNvSpPr>
+          <p:nvPr>
+            <p:ph type="sldImg"/>
+          </p:nvPr>
+        </p:nvSpPr>
+        <p:spPr/>
+      </p:sp>
+      <p:sp>
+        <p:nvSpPr>
+          <p:cNvPr id="3" name="Notes Placeholder 2"/>
+          <p:cNvSpPr>
+            <a:spLocks noGrp="1"/>
+          </p:cNvSpPr>
+          <p:nvPr>
+            <p:ph type="body" idx="1"/>
+          </p:nvPr>
+        </p:nvSpPr>
+        <p:spPr/>
+        <p:txBody>
+          <a:bodyPr/>
+          <a:lstStyle/>
+          <a:p>
+            <a:r>
+              <a:rPr lang="en-GB" dirty="0" err="1"/>
+              <a:t>Sfsdfsdfsd</a:t>
+            </a:r>
+            <a:r>
+              <a:rPr lang="en-GB" dirty="0"/>
+              <a:t> </a:t>
+            </a:r>
+            <a:endParaRPr lang="en-CY" dirty="0"/>
+          </a:p>
+        </p:txBody>
+      </p:sp>
+      <p:sp>
+        <p:nvSpPr>
+          <p:cNvPr id="4" name="Slide Number Placeholder 3"/>
+          <p:cNvSpPr>
+            <a:spLocks noGrp="1"/>
+          </p:cNvSpPr>
+          <p:nvPr>
+            <p:ph type="sldNum" sz="quarter" idx="5"/>
+          </p:nvPr>
+        </p:nvSpPr>
+        <p:spPr/>
+        <p:txBody>
+          <a:bodyPr/>
+          <a:lstStyle/>
+          <a:p>
+            <a:fld id="{2BD95660-8E7B-4493-B4B2-11817B0CC4A8}" type="slidenum">
+              <a:rPr lang="en-CY" smtClean="0"/>
+              <a:t>12</a:t>
+            </a:fld>
+            <a:endParaRPr lang="en-CY"/>
+          </a:p>
+        </p:txBody>
+      </p:sp>
+    </p:spTree>
+    <p:extLst>
+      <p:ext uri="{BB962C8B-B14F-4D97-AF65-F5344CB8AC3E}">
+        <p14:creationId xmlns:p14="http://schemas.microsoft.com/office/powerpoint/2010/main" val="110919668"/>
+      </p:ext>
+    </p:extLst>
+  </p:cSld>
+  <p:clrMapOvr>
+    <a:masterClrMapping/>
+  </p:clrMapOvr>
+</p:notes>
+</file>
+
+<file path=ppt/notesSlides/notesSlide9.xml><?xml version="1.0" encoding="utf-8"?>
+<p:notes xmlns:a="http://schemas.openxmlformats.org/drawingml/2006/main" xmlns:r="http://schemas.openxmlformats.org/officeDocument/2006/relationships" xmlns:p="http://schemas.openxmlformats.org/presentationml/2006/main">
+  <p:cSld>
+    <p:spTree>
+      <p:nvGrpSpPr>
+        <p:cNvPr id="1" name=""/>
+        <p:cNvGrpSpPr/>
+        <p:nvPr/>
+      </p:nvGrpSpPr>
+      <p:grpSpPr>
+        <a:xfrm>
+          <a:off x="0" y="0"/>
+          <a:ext cx="0" cy="0"/>
+          <a:chOff x="0" y="0"/>
+          <a:chExt cx="0" cy="0"/>
+        </a:xfrm>
+      </p:grpSpPr>
+      <p:sp>
+        <p:nvSpPr>
+          <p:cNvPr id="2" name="Slide Image Placeholder 1"/>
+          <p:cNvSpPr>
+            <a:spLocks noGrp="1" noRot="1" noChangeAspect="1"/>
+          </p:cNvSpPr>
+          <p:nvPr>
+            <p:ph type="sldImg"/>
+          </p:nvPr>
+        </p:nvSpPr>
+        <p:spPr/>
+      </p:sp>
+      <p:sp>
+        <p:nvSpPr>
+          <p:cNvPr id="3" name="Notes Placeholder 2"/>
+          <p:cNvSpPr>
+            <a:spLocks noGrp="1"/>
+          </p:cNvSpPr>
+          <p:nvPr>
+            <p:ph type="body" idx="1"/>
+          </p:nvPr>
+        </p:nvSpPr>
+        <p:spPr/>
+        <p:txBody>
+          <a:bodyPr/>
+          <a:lstStyle/>
+          <a:p>
+            <a:r>
+              <a:rPr lang="en-GB" dirty="0" err="1"/>
+              <a:t>Sfsdfsdfsd</a:t>
+            </a:r>
+            <a:r>
+              <a:rPr lang="en-GB" dirty="0"/>
+              <a:t> </a:t>
+            </a:r>
+            <a:endParaRPr lang="en-CY" dirty="0"/>
+          </a:p>
+        </p:txBody>
+      </p:sp>
+      <p:sp>
+        <p:nvSpPr>
+          <p:cNvPr id="4" name="Slide Number Placeholder 3"/>
+          <p:cNvSpPr>
+            <a:spLocks noGrp="1"/>
+          </p:cNvSpPr>
+          <p:nvPr>
+            <p:ph type="sldNum" sz="quarter" idx="5"/>
+          </p:nvPr>
+        </p:nvSpPr>
+        <p:spPr/>
+        <p:txBody>
+          <a:bodyPr/>
+          <a:lstStyle/>
+          <a:p>
+            <a:fld id="{2BD95660-8E7B-4493-B4B2-11817B0CC4A8}" type="slidenum">
+              <a:rPr lang="en-CY" smtClean="0"/>
+              <a:t>13</a:t>
+            </a:fld>
+            <a:endParaRPr lang="en-CY"/>
+          </a:p>
+        </p:txBody>
+      </p:sp>
+    </p:spTree>
+    <p:extLst>
+      <p:ext uri="{BB962C8B-B14F-4D97-AF65-F5344CB8AC3E}">
+        <p14:creationId xmlns:p14="http://schemas.microsoft.com/office/powerpoint/2010/main" val="2194103366"/>
       </p:ext>
     </p:extLst>
   </p:cSld>
@@ -4601,6 +5350,1850 @@
 </p:sld>
 </file>
 
+<file path=ppt/slides/slide10.xml><?xml version="1.0" encoding="utf-8"?>
+<p:sld xmlns:a="http://schemas.openxmlformats.org/drawingml/2006/main" xmlns:r="http://schemas.openxmlformats.org/officeDocument/2006/relationships" xmlns:p="http://schemas.openxmlformats.org/presentationml/2006/main">
+  <p:cSld>
+    <p:bg>
+      <p:bgPr>
+        <a:solidFill>
+          <a:schemeClr val="bg1">
+            <a:lumMod val="95000"/>
+          </a:schemeClr>
+        </a:solidFill>
+        <a:effectLst/>
+      </p:bgPr>
+    </p:bg>
+    <p:spTree>
+      <p:nvGrpSpPr>
+        <p:cNvPr id="1" name=""/>
+        <p:cNvGrpSpPr/>
+        <p:nvPr/>
+      </p:nvGrpSpPr>
+      <p:grpSpPr>
+        <a:xfrm>
+          <a:off x="0" y="0"/>
+          <a:ext cx="0" cy="0"/>
+          <a:chOff x="0" y="0"/>
+          <a:chExt cx="0" cy="0"/>
+        </a:xfrm>
+      </p:grpSpPr>
+      <p:sp useBgFill="1">
+        <p:nvSpPr>
+          <p:cNvPr id="78" name="Rectangle 77">
+            <a:extLst>
+              <a:ext uri="{FF2B5EF4-FFF2-40B4-BE49-F238E27FC236}">
+                <a16:creationId xmlns:a16="http://schemas.microsoft.com/office/drawing/2014/main" id="{80861964-D86C-4A50-8F6D-B466384A61B1}"/>
+              </a:ext>
+              <a:ext uri="{C183D7F6-B498-43B3-948B-1728B52AA6E4}">
+                <adec:decorative xmlns:adec="http://schemas.microsoft.com/office/drawing/2017/decorative" val="1"/>
+              </a:ext>
+            </a:extLst>
+          </p:cNvPr>
+          <p:cNvSpPr>
+            <a:spLocks noGrp="1" noRot="1" noChangeAspect="1" noMove="1" noResize="1" noEditPoints="1" noAdjustHandles="1" noChangeArrowheads="1" noChangeShapeType="1" noTextEdit="1"/>
+          </p:cNvSpPr>
+          <p:nvPr>
+            <p:extLst>
+              <p:ext uri="{386F3935-93C4-4BCD-93E2-E3B085C9AB24}">
+                <p16:designElem xmlns:p16="http://schemas.microsoft.com/office/powerpoint/2015/main" val="1"/>
+              </p:ext>
+            </p:extLst>
+          </p:nvPr>
+        </p:nvSpPr>
+        <p:spPr>
+          <a:xfrm>
+            <a:off x="0" y="0"/>
+            <a:ext cx="12192001" cy="6858000"/>
+          </a:xfrm>
+          <a:prstGeom prst="rect">
+            <a:avLst/>
+          </a:prstGeom>
+          <a:ln>
+            <a:noFill/>
+          </a:ln>
+        </p:spPr>
+        <p:style>
+          <a:lnRef idx="2">
+            <a:schemeClr val="accent1">
+              <a:shade val="50000"/>
+            </a:schemeClr>
+          </a:lnRef>
+          <a:fillRef idx="1">
+            <a:schemeClr val="accent1"/>
+          </a:fillRef>
+          <a:effectRef idx="0">
+            <a:schemeClr val="accent1"/>
+          </a:effectRef>
+          <a:fontRef idx="minor">
+            <a:schemeClr val="lt1"/>
+          </a:fontRef>
+        </p:style>
+        <p:txBody>
+          <a:bodyPr rtlCol="0" anchor="ctr"/>
+          <a:lstStyle/>
+          <a:p>
+            <a:pPr algn="ctr"/>
+            <a:endParaRPr lang="en-US"/>
+          </a:p>
+        </p:txBody>
+      </p:sp>
+      <p:sp>
+        <p:nvSpPr>
+          <p:cNvPr id="2" name="Title 1">
+            <a:extLst>
+              <a:ext uri="{FF2B5EF4-FFF2-40B4-BE49-F238E27FC236}">
+                <a16:creationId xmlns:a16="http://schemas.microsoft.com/office/drawing/2014/main" id="{2B44E995-5C74-F080-87CB-013DF8B69CD8}"/>
+              </a:ext>
+            </a:extLst>
+          </p:cNvPr>
+          <p:cNvSpPr>
+            <a:spLocks noGrp="1"/>
+          </p:cNvSpPr>
+          <p:nvPr>
+            <p:ph type="title"/>
+          </p:nvPr>
+        </p:nvSpPr>
+        <p:spPr>
+          <a:xfrm>
+            <a:off x="7859485" y="634946"/>
+            <a:ext cx="3690257" cy="1450757"/>
+          </a:xfrm>
+        </p:spPr>
+        <p:txBody>
+          <a:bodyPr>
+            <a:normAutofit/>
+          </a:bodyPr>
+          <a:lstStyle/>
+          <a:p>
+            <a:r>
+              <a:rPr lang="en-GB" dirty="0"/>
+              <a:t>Enquiries</a:t>
+            </a:r>
+            <a:endParaRPr lang="en-CY" dirty="0"/>
+          </a:p>
+        </p:txBody>
+      </p:sp>
+      <p:cxnSp>
+        <p:nvCxnSpPr>
+          <p:cNvPr id="80" name="Straight Connector 79">
+            <a:extLst>
+              <a:ext uri="{FF2B5EF4-FFF2-40B4-BE49-F238E27FC236}">
+                <a16:creationId xmlns:a16="http://schemas.microsoft.com/office/drawing/2014/main" id="{754A678E-8F30-4E92-A5BF-F5D03D011394}"/>
+              </a:ext>
+              <a:ext uri="{C183D7F6-B498-43B3-948B-1728B52AA6E4}">
+                <adec:decorative xmlns:adec="http://schemas.microsoft.com/office/drawing/2017/decorative" val="1"/>
+              </a:ext>
+            </a:extLst>
+          </p:cNvPr>
+          <p:cNvCxnSpPr>
+            <a:cxnSpLocks noGrp="1" noRot="1" noChangeAspect="1" noMove="1" noResize="1" noEditPoints="1" noAdjustHandles="1" noChangeArrowheads="1" noChangeShapeType="1"/>
+          </p:cNvCxnSpPr>
+          <p:nvPr>
+            <p:extLst>
+              <p:ext uri="{386F3935-93C4-4BCD-93E2-E3B085C9AB24}">
+                <p16:designElem xmlns:p16="http://schemas.microsoft.com/office/powerpoint/2015/main" val="1"/>
+              </p:ext>
+            </p:extLst>
+          </p:nvPr>
+        </p:nvCxnSpPr>
+        <p:spPr>
+          <a:xfrm>
+            <a:off x="7898967" y="2246569"/>
+            <a:ext cx="3474720" cy="0"/>
+          </a:xfrm>
+          <a:prstGeom prst="line">
+            <a:avLst/>
+          </a:prstGeom>
+          <a:ln w="12700">
+            <a:solidFill>
+              <a:schemeClr val="tx1">
+                <a:lumMod val="75000"/>
+                <a:lumOff val="25000"/>
+              </a:schemeClr>
+            </a:solidFill>
+          </a:ln>
+        </p:spPr>
+        <p:style>
+          <a:lnRef idx="1">
+            <a:schemeClr val="accent1"/>
+          </a:lnRef>
+          <a:fillRef idx="0">
+            <a:schemeClr val="accent1"/>
+          </a:fillRef>
+          <a:effectRef idx="0">
+            <a:schemeClr val="accent1"/>
+          </a:effectRef>
+          <a:fontRef idx="minor">
+            <a:schemeClr val="tx1"/>
+          </a:fontRef>
+        </p:style>
+      </p:cxnSp>
+      <p:sp>
+        <p:nvSpPr>
+          <p:cNvPr id="3" name="Content Placeholder 2">
+            <a:extLst>
+              <a:ext uri="{FF2B5EF4-FFF2-40B4-BE49-F238E27FC236}">
+                <a16:creationId xmlns:a16="http://schemas.microsoft.com/office/drawing/2014/main" id="{6311D31F-A605-BD54-9B7F-357428D58B88}"/>
+              </a:ext>
+            </a:extLst>
+          </p:cNvPr>
+          <p:cNvSpPr>
+            <a:spLocks noGrp="1"/>
+          </p:cNvSpPr>
+          <p:nvPr>
+            <p:ph idx="1"/>
+          </p:nvPr>
+        </p:nvSpPr>
+        <p:spPr>
+          <a:xfrm>
+            <a:off x="7859485" y="2407436"/>
+            <a:ext cx="3690257" cy="3461658"/>
+          </a:xfrm>
+        </p:spPr>
+        <p:txBody>
+          <a:bodyPr>
+            <a:normAutofit/>
+          </a:bodyPr>
+          <a:lstStyle/>
+          <a:p>
+            <a:pPr marL="0" indent="0">
+              <a:buNone/>
+            </a:pPr>
+            <a:r>
+              <a:rPr lang="en-GB" dirty="0"/>
+              <a:t>A </a:t>
+            </a:r>
+            <a:r>
+              <a:rPr lang="en-GB" b="1" dirty="0"/>
+              <a:t>contact page </a:t>
+            </a:r>
+            <a:r>
+              <a:rPr lang="en-GB" dirty="0"/>
+              <a:t>has also been put in place for customers that have any concerns or feedback</a:t>
+            </a:r>
+          </a:p>
+          <a:p>
+            <a:pPr>
+              <a:buFont typeface="Wingdings" panose="05000000000000000000" pitchFamily="2" charset="2"/>
+              <a:buChar char="v"/>
+            </a:pPr>
+            <a:endParaRPr lang="en-GB" dirty="0"/>
+          </a:p>
+        </p:txBody>
+      </p:sp>
+      <p:sp>
+        <p:nvSpPr>
+          <p:cNvPr id="82" name="Rectangle 81">
+            <a:extLst>
+              <a:ext uri="{FF2B5EF4-FFF2-40B4-BE49-F238E27FC236}">
+                <a16:creationId xmlns:a16="http://schemas.microsoft.com/office/drawing/2014/main" id="{F2BDE551-930A-4FE1-8434-09824E3247E6}"/>
+              </a:ext>
+              <a:ext uri="{C183D7F6-B498-43B3-948B-1728B52AA6E4}">
+                <adec:decorative xmlns:adec="http://schemas.microsoft.com/office/drawing/2017/decorative" val="1"/>
+              </a:ext>
+            </a:extLst>
+          </p:cNvPr>
+          <p:cNvSpPr>
+            <a:spLocks noGrp="1" noRot="1" noChangeAspect="1" noMove="1" noResize="1" noEditPoints="1" noAdjustHandles="1" noChangeArrowheads="1" noChangeShapeType="1" noTextEdit="1"/>
+          </p:cNvSpPr>
+          <p:nvPr>
+            <p:extLst>
+              <p:ext uri="{386F3935-93C4-4BCD-93E2-E3B085C9AB24}">
+                <p16:designElem xmlns:p16="http://schemas.microsoft.com/office/powerpoint/2015/main" val="1"/>
+              </p:ext>
+            </p:extLst>
+          </p:nvPr>
+        </p:nvSpPr>
+        <p:spPr>
+          <a:xfrm>
+            <a:off x="0" y="6400800"/>
+            <a:ext cx="12192000" cy="457200"/>
+          </a:xfrm>
+          <a:prstGeom prst="rect">
+            <a:avLst/>
+          </a:prstGeom>
+          <a:solidFill>
+            <a:srgbClr val="262626"/>
+          </a:solidFill>
+          <a:ln>
+            <a:noFill/>
+          </a:ln>
+        </p:spPr>
+        <p:style>
+          <a:lnRef idx="2">
+            <a:schemeClr val="accent1">
+              <a:shade val="50000"/>
+            </a:schemeClr>
+          </a:lnRef>
+          <a:fillRef idx="1">
+            <a:schemeClr val="accent1"/>
+          </a:fillRef>
+          <a:effectRef idx="0">
+            <a:schemeClr val="accent1"/>
+          </a:effectRef>
+          <a:fontRef idx="minor">
+            <a:schemeClr val="lt1"/>
+          </a:fontRef>
+        </p:style>
+      </p:sp>
+      <p:pic>
+        <p:nvPicPr>
+          <p:cNvPr id="8" name="Picture 7">
+            <a:extLst>
+              <a:ext uri="{FF2B5EF4-FFF2-40B4-BE49-F238E27FC236}">
+                <a16:creationId xmlns:a16="http://schemas.microsoft.com/office/drawing/2014/main" id="{1EDCDC83-B263-EEAC-273F-6CE28006475F}"/>
+              </a:ext>
+            </a:extLst>
+          </p:cNvPr>
+          <p:cNvPicPr>
+            <a:picLocks noChangeAspect="1"/>
+          </p:cNvPicPr>
+          <p:nvPr/>
+        </p:nvPicPr>
+        <p:blipFill>
+          <a:blip r:embed="rId3"/>
+          <a:stretch>
+            <a:fillRect/>
+          </a:stretch>
+        </p:blipFill>
+        <p:spPr>
+          <a:xfrm>
+            <a:off x="553399" y="861567"/>
+            <a:ext cx="5821629" cy="4677667"/>
+          </a:xfrm>
+          <a:prstGeom prst="rect">
+            <a:avLst/>
+          </a:prstGeom>
+        </p:spPr>
+      </p:pic>
+    </p:spTree>
+    <p:extLst>
+      <p:ext uri="{BB962C8B-B14F-4D97-AF65-F5344CB8AC3E}">
+        <p14:creationId xmlns:p14="http://schemas.microsoft.com/office/powerpoint/2010/main" val="842820337"/>
+      </p:ext>
+    </p:extLst>
+  </p:cSld>
+  <p:clrMapOvr>
+    <a:masterClrMapping/>
+  </p:clrMapOvr>
+</p:sld>
+</file>
+
+<file path=ppt/slides/slide11.xml><?xml version="1.0" encoding="utf-8"?>
+<p:sld xmlns:a="http://schemas.openxmlformats.org/drawingml/2006/main" xmlns:r="http://schemas.openxmlformats.org/officeDocument/2006/relationships" xmlns:p="http://schemas.openxmlformats.org/presentationml/2006/main">
+  <p:cSld>
+    <p:bg>
+      <p:bgPr>
+        <a:solidFill>
+          <a:schemeClr val="bg1">
+            <a:lumMod val="95000"/>
+          </a:schemeClr>
+        </a:solidFill>
+        <a:effectLst/>
+      </p:bgPr>
+    </p:bg>
+    <p:spTree>
+      <p:nvGrpSpPr>
+        <p:cNvPr id="1" name=""/>
+        <p:cNvGrpSpPr/>
+        <p:nvPr/>
+      </p:nvGrpSpPr>
+      <p:grpSpPr>
+        <a:xfrm>
+          <a:off x="0" y="0"/>
+          <a:ext cx="0" cy="0"/>
+          <a:chOff x="0" y="0"/>
+          <a:chExt cx="0" cy="0"/>
+        </a:xfrm>
+      </p:grpSpPr>
+      <p:sp useBgFill="1">
+        <p:nvSpPr>
+          <p:cNvPr id="78" name="Rectangle 77">
+            <a:extLst>
+              <a:ext uri="{FF2B5EF4-FFF2-40B4-BE49-F238E27FC236}">
+                <a16:creationId xmlns:a16="http://schemas.microsoft.com/office/drawing/2014/main" id="{80861964-D86C-4A50-8F6D-B466384A61B1}"/>
+              </a:ext>
+              <a:ext uri="{C183D7F6-B498-43B3-948B-1728B52AA6E4}">
+                <adec:decorative xmlns:adec="http://schemas.microsoft.com/office/drawing/2017/decorative" val="1"/>
+              </a:ext>
+            </a:extLst>
+          </p:cNvPr>
+          <p:cNvSpPr>
+            <a:spLocks noGrp="1" noRot="1" noChangeAspect="1" noMove="1" noResize="1" noEditPoints="1" noAdjustHandles="1" noChangeArrowheads="1" noChangeShapeType="1" noTextEdit="1"/>
+          </p:cNvSpPr>
+          <p:nvPr>
+            <p:extLst>
+              <p:ext uri="{386F3935-93C4-4BCD-93E2-E3B085C9AB24}">
+                <p16:designElem xmlns:p16="http://schemas.microsoft.com/office/powerpoint/2015/main" val="1"/>
+              </p:ext>
+            </p:extLst>
+          </p:nvPr>
+        </p:nvSpPr>
+        <p:spPr>
+          <a:xfrm>
+            <a:off x="0" y="0"/>
+            <a:ext cx="12192001" cy="6858000"/>
+          </a:xfrm>
+          <a:prstGeom prst="rect">
+            <a:avLst/>
+          </a:prstGeom>
+          <a:ln>
+            <a:noFill/>
+          </a:ln>
+        </p:spPr>
+        <p:style>
+          <a:lnRef idx="2">
+            <a:schemeClr val="accent1">
+              <a:shade val="50000"/>
+            </a:schemeClr>
+          </a:lnRef>
+          <a:fillRef idx="1">
+            <a:schemeClr val="accent1"/>
+          </a:fillRef>
+          <a:effectRef idx="0">
+            <a:schemeClr val="accent1"/>
+          </a:effectRef>
+          <a:fontRef idx="minor">
+            <a:schemeClr val="lt1"/>
+          </a:fontRef>
+        </p:style>
+        <p:txBody>
+          <a:bodyPr rtlCol="0" anchor="ctr"/>
+          <a:lstStyle/>
+          <a:p>
+            <a:pPr algn="ctr"/>
+            <a:endParaRPr lang="en-US"/>
+          </a:p>
+        </p:txBody>
+      </p:sp>
+      <p:sp>
+        <p:nvSpPr>
+          <p:cNvPr id="2" name="Title 1">
+            <a:extLst>
+              <a:ext uri="{FF2B5EF4-FFF2-40B4-BE49-F238E27FC236}">
+                <a16:creationId xmlns:a16="http://schemas.microsoft.com/office/drawing/2014/main" id="{2B44E995-5C74-F080-87CB-013DF8B69CD8}"/>
+              </a:ext>
+            </a:extLst>
+          </p:cNvPr>
+          <p:cNvSpPr>
+            <a:spLocks noGrp="1"/>
+          </p:cNvSpPr>
+          <p:nvPr>
+            <p:ph type="title"/>
+          </p:nvPr>
+        </p:nvSpPr>
+        <p:spPr>
+          <a:xfrm>
+            <a:off x="513513" y="945058"/>
+            <a:ext cx="4570872" cy="1450757"/>
+          </a:xfrm>
+        </p:spPr>
+        <p:txBody>
+          <a:bodyPr>
+            <a:normAutofit/>
+          </a:bodyPr>
+          <a:lstStyle/>
+          <a:p>
+            <a:r>
+              <a:rPr lang="en-GB" dirty="0"/>
+              <a:t>Header &amp; Footer</a:t>
+            </a:r>
+            <a:endParaRPr lang="en-CY" dirty="0"/>
+          </a:p>
+        </p:txBody>
+      </p:sp>
+      <p:cxnSp>
+        <p:nvCxnSpPr>
+          <p:cNvPr id="80" name="Straight Connector 79">
+            <a:extLst>
+              <a:ext uri="{FF2B5EF4-FFF2-40B4-BE49-F238E27FC236}">
+                <a16:creationId xmlns:a16="http://schemas.microsoft.com/office/drawing/2014/main" id="{754A678E-8F30-4E92-A5BF-F5D03D011394}"/>
+              </a:ext>
+              <a:ext uri="{C183D7F6-B498-43B3-948B-1728B52AA6E4}">
+                <adec:decorative xmlns:adec="http://schemas.microsoft.com/office/drawing/2017/decorative" val="1"/>
+              </a:ext>
+            </a:extLst>
+          </p:cNvPr>
+          <p:cNvCxnSpPr>
+            <a:cxnSpLocks noGrp="1" noRot="1" noChangeAspect="1" noMove="1" noResize="1" noEditPoints="1" noAdjustHandles="1" noChangeArrowheads="1" noChangeShapeType="1"/>
+          </p:cNvCxnSpPr>
+          <p:nvPr>
+            <p:extLst>
+              <p:ext uri="{386F3935-93C4-4BCD-93E2-E3B085C9AB24}">
+                <p16:designElem xmlns:p16="http://schemas.microsoft.com/office/powerpoint/2015/main" val="1"/>
+              </p:ext>
+            </p:extLst>
+          </p:nvPr>
+        </p:nvCxnSpPr>
+        <p:spPr>
+          <a:xfrm>
+            <a:off x="7898967" y="2246569"/>
+            <a:ext cx="3474720" cy="0"/>
+          </a:xfrm>
+          <a:prstGeom prst="line">
+            <a:avLst/>
+          </a:prstGeom>
+          <a:ln w="12700">
+            <a:solidFill>
+              <a:schemeClr val="tx1">
+                <a:lumMod val="75000"/>
+                <a:lumOff val="25000"/>
+              </a:schemeClr>
+            </a:solidFill>
+          </a:ln>
+        </p:spPr>
+        <p:style>
+          <a:lnRef idx="1">
+            <a:schemeClr val="accent1"/>
+          </a:lnRef>
+          <a:fillRef idx="0">
+            <a:schemeClr val="accent1"/>
+          </a:fillRef>
+          <a:effectRef idx="0">
+            <a:schemeClr val="accent1"/>
+          </a:effectRef>
+          <a:fontRef idx="minor">
+            <a:schemeClr val="tx1"/>
+          </a:fontRef>
+        </p:style>
+      </p:cxnSp>
+      <p:sp>
+        <p:nvSpPr>
+          <p:cNvPr id="3" name="Content Placeholder 2">
+            <a:extLst>
+              <a:ext uri="{FF2B5EF4-FFF2-40B4-BE49-F238E27FC236}">
+                <a16:creationId xmlns:a16="http://schemas.microsoft.com/office/drawing/2014/main" id="{6311D31F-A605-BD54-9B7F-357428D58B88}"/>
+              </a:ext>
+            </a:extLst>
+          </p:cNvPr>
+          <p:cNvSpPr>
+            <a:spLocks noGrp="1"/>
+          </p:cNvSpPr>
+          <p:nvPr>
+            <p:ph idx="1"/>
+          </p:nvPr>
+        </p:nvSpPr>
+        <p:spPr>
+          <a:xfrm>
+            <a:off x="7859485" y="2407436"/>
+            <a:ext cx="3690257" cy="3461658"/>
+          </a:xfrm>
+        </p:spPr>
+        <p:txBody>
+          <a:bodyPr>
+            <a:normAutofit/>
+          </a:bodyPr>
+          <a:lstStyle/>
+          <a:p>
+            <a:pPr marL="0" indent="0">
+              <a:buNone/>
+            </a:pPr>
+            <a:r>
+              <a:rPr lang="en-GB" dirty="0"/>
+              <a:t>Useful links with a sleek design, implemented, in a </a:t>
+            </a:r>
+            <a:r>
+              <a:rPr lang="en-GB" b="1" dirty="0"/>
+              <a:t>base template </a:t>
+            </a:r>
+            <a:r>
+              <a:rPr lang="en-GB" dirty="0"/>
+              <a:t>pages extend from.</a:t>
+            </a:r>
+          </a:p>
+          <a:p>
+            <a:pPr>
+              <a:buFont typeface="Wingdings" panose="05000000000000000000" pitchFamily="2" charset="2"/>
+              <a:buChar char="v"/>
+            </a:pPr>
+            <a:endParaRPr lang="en-GB" dirty="0"/>
+          </a:p>
+        </p:txBody>
+      </p:sp>
+      <p:sp>
+        <p:nvSpPr>
+          <p:cNvPr id="82" name="Rectangle 81">
+            <a:extLst>
+              <a:ext uri="{FF2B5EF4-FFF2-40B4-BE49-F238E27FC236}">
+                <a16:creationId xmlns:a16="http://schemas.microsoft.com/office/drawing/2014/main" id="{F2BDE551-930A-4FE1-8434-09824E3247E6}"/>
+              </a:ext>
+              <a:ext uri="{C183D7F6-B498-43B3-948B-1728B52AA6E4}">
+                <adec:decorative xmlns:adec="http://schemas.microsoft.com/office/drawing/2017/decorative" val="1"/>
+              </a:ext>
+            </a:extLst>
+          </p:cNvPr>
+          <p:cNvSpPr>
+            <a:spLocks noGrp="1" noRot="1" noChangeAspect="1" noMove="1" noResize="1" noEditPoints="1" noAdjustHandles="1" noChangeArrowheads="1" noChangeShapeType="1" noTextEdit="1"/>
+          </p:cNvSpPr>
+          <p:nvPr>
+            <p:extLst>
+              <p:ext uri="{386F3935-93C4-4BCD-93E2-E3B085C9AB24}">
+                <p16:designElem xmlns:p16="http://schemas.microsoft.com/office/powerpoint/2015/main" val="1"/>
+              </p:ext>
+            </p:extLst>
+          </p:nvPr>
+        </p:nvSpPr>
+        <p:spPr>
+          <a:xfrm>
+            <a:off x="0" y="6400800"/>
+            <a:ext cx="12192000" cy="457200"/>
+          </a:xfrm>
+          <a:prstGeom prst="rect">
+            <a:avLst/>
+          </a:prstGeom>
+          <a:solidFill>
+            <a:srgbClr val="262626"/>
+          </a:solidFill>
+          <a:ln>
+            <a:noFill/>
+          </a:ln>
+        </p:spPr>
+        <p:style>
+          <a:lnRef idx="2">
+            <a:schemeClr val="accent1">
+              <a:shade val="50000"/>
+            </a:schemeClr>
+          </a:lnRef>
+          <a:fillRef idx="1">
+            <a:schemeClr val="accent1"/>
+          </a:fillRef>
+          <a:effectRef idx="0">
+            <a:schemeClr val="accent1"/>
+          </a:effectRef>
+          <a:fontRef idx="minor">
+            <a:schemeClr val="lt1"/>
+          </a:fontRef>
+        </p:style>
+      </p:sp>
+      <p:pic>
+        <p:nvPicPr>
+          <p:cNvPr id="5" name="Picture 4">
+            <a:extLst>
+              <a:ext uri="{FF2B5EF4-FFF2-40B4-BE49-F238E27FC236}">
+                <a16:creationId xmlns:a16="http://schemas.microsoft.com/office/drawing/2014/main" id="{73E7437E-F6EA-9C7F-6F34-5FF5A3795083}"/>
+              </a:ext>
+            </a:extLst>
+          </p:cNvPr>
+          <p:cNvPicPr>
+            <a:picLocks noChangeAspect="1"/>
+          </p:cNvPicPr>
+          <p:nvPr/>
+        </p:nvPicPr>
+        <p:blipFill>
+          <a:blip r:embed="rId3"/>
+          <a:stretch>
+            <a:fillRect/>
+          </a:stretch>
+        </p:blipFill>
+        <p:spPr>
+          <a:xfrm>
+            <a:off x="315308" y="174739"/>
+            <a:ext cx="11363179" cy="919564"/>
+          </a:xfrm>
+          <a:prstGeom prst="rect">
+            <a:avLst/>
+          </a:prstGeom>
+        </p:spPr>
+      </p:pic>
+      <p:pic>
+        <p:nvPicPr>
+          <p:cNvPr id="14" name="Picture 13">
+            <a:extLst>
+              <a:ext uri="{FF2B5EF4-FFF2-40B4-BE49-F238E27FC236}">
+                <a16:creationId xmlns:a16="http://schemas.microsoft.com/office/drawing/2014/main" id="{6105741E-A591-AEFC-2075-D7091AF4D093}"/>
+              </a:ext>
+            </a:extLst>
+          </p:cNvPr>
+          <p:cNvPicPr>
+            <a:picLocks noChangeAspect="1"/>
+          </p:cNvPicPr>
+          <p:nvPr/>
+        </p:nvPicPr>
+        <p:blipFill>
+          <a:blip r:embed="rId4"/>
+          <a:stretch>
+            <a:fillRect/>
+          </a:stretch>
+        </p:blipFill>
+        <p:spPr>
+          <a:xfrm>
+            <a:off x="315310" y="3708947"/>
+            <a:ext cx="11363178" cy="2522923"/>
+          </a:xfrm>
+          <a:prstGeom prst="rect">
+            <a:avLst/>
+          </a:prstGeom>
+        </p:spPr>
+      </p:pic>
+    </p:spTree>
+    <p:extLst>
+      <p:ext uri="{BB962C8B-B14F-4D97-AF65-F5344CB8AC3E}">
+        <p14:creationId xmlns:p14="http://schemas.microsoft.com/office/powerpoint/2010/main" val="2656201820"/>
+      </p:ext>
+    </p:extLst>
+  </p:cSld>
+  <p:clrMapOvr>
+    <a:masterClrMapping/>
+  </p:clrMapOvr>
+</p:sld>
+</file>
+
+<file path=ppt/slides/slide12.xml><?xml version="1.0" encoding="utf-8"?>
+<p:sld xmlns:a="http://schemas.openxmlformats.org/drawingml/2006/main" xmlns:r="http://schemas.openxmlformats.org/officeDocument/2006/relationships" xmlns:p="http://schemas.openxmlformats.org/presentationml/2006/main">
+  <p:cSld>
+    <p:bg>
+      <p:bgPr>
+        <a:solidFill>
+          <a:schemeClr val="bg1">
+            <a:lumMod val="95000"/>
+          </a:schemeClr>
+        </a:solidFill>
+        <a:effectLst/>
+      </p:bgPr>
+    </p:bg>
+    <p:spTree>
+      <p:nvGrpSpPr>
+        <p:cNvPr id="1" name=""/>
+        <p:cNvGrpSpPr/>
+        <p:nvPr/>
+      </p:nvGrpSpPr>
+      <p:grpSpPr>
+        <a:xfrm>
+          <a:off x="0" y="0"/>
+          <a:ext cx="0" cy="0"/>
+          <a:chOff x="0" y="0"/>
+          <a:chExt cx="0" cy="0"/>
+        </a:xfrm>
+      </p:grpSpPr>
+      <p:sp useBgFill="1">
+        <p:nvSpPr>
+          <p:cNvPr id="96" name="Rectangle 95">
+            <a:extLst>
+              <a:ext uri="{FF2B5EF4-FFF2-40B4-BE49-F238E27FC236}">
+                <a16:creationId xmlns:a16="http://schemas.microsoft.com/office/drawing/2014/main" id="{F4FAA6B4-BAFB-4474-9B14-DC83A9096513}"/>
+              </a:ext>
+              <a:ext uri="{C183D7F6-B498-43B3-948B-1728B52AA6E4}">
+                <adec:decorative xmlns:adec="http://schemas.microsoft.com/office/drawing/2017/decorative" val="1"/>
+              </a:ext>
+            </a:extLst>
+          </p:cNvPr>
+          <p:cNvSpPr>
+            <a:spLocks noGrp="1" noRot="1" noChangeAspect="1" noMove="1" noResize="1" noEditPoints="1" noAdjustHandles="1" noChangeArrowheads="1" noChangeShapeType="1" noTextEdit="1"/>
+          </p:cNvSpPr>
+          <p:nvPr>
+            <p:extLst>
+              <p:ext uri="{386F3935-93C4-4BCD-93E2-E3B085C9AB24}">
+                <p16:designElem xmlns:p16="http://schemas.microsoft.com/office/powerpoint/2015/main" val="1"/>
+              </p:ext>
+            </p:extLst>
+          </p:nvPr>
+        </p:nvSpPr>
+        <p:spPr>
+          <a:xfrm>
+            <a:off x="0" y="0"/>
+            <a:ext cx="12192000" cy="6858000"/>
+          </a:xfrm>
+          <a:prstGeom prst="rect">
+            <a:avLst/>
+          </a:prstGeom>
+          <a:ln>
+            <a:noFill/>
+          </a:ln>
+        </p:spPr>
+        <p:style>
+          <a:lnRef idx="2">
+            <a:schemeClr val="accent1">
+              <a:shade val="50000"/>
+            </a:schemeClr>
+          </a:lnRef>
+          <a:fillRef idx="1">
+            <a:schemeClr val="accent1"/>
+          </a:fillRef>
+          <a:effectRef idx="0">
+            <a:schemeClr val="accent1"/>
+          </a:effectRef>
+          <a:fontRef idx="minor">
+            <a:schemeClr val="lt1"/>
+          </a:fontRef>
+        </p:style>
+        <p:txBody>
+          <a:bodyPr rtlCol="0" anchor="ctr"/>
+          <a:lstStyle/>
+          <a:p>
+            <a:pPr algn="ctr"/>
+            <a:endParaRPr lang="en-US"/>
+          </a:p>
+        </p:txBody>
+      </p:sp>
+      <p:sp>
+        <p:nvSpPr>
+          <p:cNvPr id="2" name="Title 1">
+            <a:extLst>
+              <a:ext uri="{FF2B5EF4-FFF2-40B4-BE49-F238E27FC236}">
+                <a16:creationId xmlns:a16="http://schemas.microsoft.com/office/drawing/2014/main" id="{2B44E995-5C74-F080-87CB-013DF8B69CD8}"/>
+              </a:ext>
+            </a:extLst>
+          </p:cNvPr>
+          <p:cNvSpPr>
+            <a:spLocks noGrp="1"/>
+          </p:cNvSpPr>
+          <p:nvPr>
+            <p:ph type="title"/>
+          </p:nvPr>
+        </p:nvSpPr>
+        <p:spPr>
+          <a:xfrm>
+            <a:off x="1036320" y="286603"/>
+            <a:ext cx="10058400" cy="1450757"/>
+          </a:xfrm>
+        </p:spPr>
+        <p:txBody>
+          <a:bodyPr>
+            <a:normAutofit/>
+          </a:bodyPr>
+          <a:lstStyle/>
+          <a:p>
+            <a:r>
+              <a:rPr lang="en-GB" dirty="0"/>
+              <a:t>Modularity</a:t>
+            </a:r>
+            <a:endParaRPr lang="en-CY" dirty="0"/>
+          </a:p>
+        </p:txBody>
+      </p:sp>
+      <p:cxnSp>
+        <p:nvCxnSpPr>
+          <p:cNvPr id="98" name="Straight Connector 97">
+            <a:extLst>
+              <a:ext uri="{FF2B5EF4-FFF2-40B4-BE49-F238E27FC236}">
+                <a16:creationId xmlns:a16="http://schemas.microsoft.com/office/drawing/2014/main" id="{4364CDC3-ADB0-4691-9286-5925F160C2D5}"/>
+              </a:ext>
+              <a:ext uri="{C183D7F6-B498-43B3-948B-1728B52AA6E4}">
+                <adec:decorative xmlns:adec="http://schemas.microsoft.com/office/drawing/2017/decorative" val="1"/>
+              </a:ext>
+            </a:extLst>
+          </p:cNvPr>
+          <p:cNvCxnSpPr>
+            <a:cxnSpLocks noGrp="1" noRot="1" noChangeAspect="1" noMove="1" noResize="1" noEditPoints="1" noAdjustHandles="1" noChangeArrowheads="1" noChangeShapeType="1"/>
+          </p:cNvCxnSpPr>
+          <p:nvPr>
+            <p:extLst>
+              <p:ext uri="{386F3935-93C4-4BCD-93E2-E3B085C9AB24}">
+                <p16:designElem xmlns:p16="http://schemas.microsoft.com/office/powerpoint/2015/main" val="1"/>
+              </p:ext>
+            </p:extLst>
+          </p:nvPr>
+        </p:nvCxnSpPr>
+        <p:spPr>
+          <a:xfrm>
+            <a:off x="1031509" y="1897380"/>
+            <a:ext cx="9966960" cy="0"/>
+          </a:xfrm>
+          <a:prstGeom prst="line">
+            <a:avLst/>
+          </a:prstGeom>
+          <a:ln w="12700">
+            <a:solidFill>
+              <a:schemeClr val="tx1">
+                <a:lumMod val="75000"/>
+                <a:lumOff val="25000"/>
+              </a:schemeClr>
+            </a:solidFill>
+          </a:ln>
+        </p:spPr>
+        <p:style>
+          <a:lnRef idx="1">
+            <a:schemeClr val="accent1"/>
+          </a:lnRef>
+          <a:fillRef idx="0">
+            <a:schemeClr val="accent1"/>
+          </a:fillRef>
+          <a:effectRef idx="0">
+            <a:schemeClr val="accent1"/>
+          </a:effectRef>
+          <a:fontRef idx="minor">
+            <a:schemeClr val="tx1"/>
+          </a:fontRef>
+        </p:style>
+      </p:cxnSp>
+      <p:pic>
+        <p:nvPicPr>
+          <p:cNvPr id="5" name="Picture 4">
+            <a:extLst>
+              <a:ext uri="{FF2B5EF4-FFF2-40B4-BE49-F238E27FC236}">
+                <a16:creationId xmlns:a16="http://schemas.microsoft.com/office/drawing/2014/main" id="{27635B40-7818-2E12-8A14-ABB7DDCA04EF}"/>
+              </a:ext>
+            </a:extLst>
+          </p:cNvPr>
+          <p:cNvPicPr>
+            <a:picLocks noChangeAspect="1"/>
+          </p:cNvPicPr>
+          <p:nvPr/>
+        </p:nvPicPr>
+        <p:blipFill rotWithShape="1">
+          <a:blip r:embed="rId3"/>
+          <a:srcRect t="1450" r="1" b="1"/>
+          <a:stretch/>
+        </p:blipFill>
+        <p:spPr>
+          <a:xfrm>
+            <a:off x="1036320" y="2108199"/>
+            <a:ext cx="3044106" cy="3760873"/>
+          </a:xfrm>
+          <a:prstGeom prst="rect">
+            <a:avLst/>
+          </a:prstGeom>
+        </p:spPr>
+      </p:pic>
+      <p:pic>
+        <p:nvPicPr>
+          <p:cNvPr id="8" name="Picture 7">
+            <a:extLst>
+              <a:ext uri="{FF2B5EF4-FFF2-40B4-BE49-F238E27FC236}">
+                <a16:creationId xmlns:a16="http://schemas.microsoft.com/office/drawing/2014/main" id="{18518DE9-C451-90ED-A270-38BBF9936946}"/>
+              </a:ext>
+            </a:extLst>
+          </p:cNvPr>
+          <p:cNvPicPr>
+            <a:picLocks noChangeAspect="1"/>
+          </p:cNvPicPr>
+          <p:nvPr/>
+        </p:nvPicPr>
+        <p:blipFill rotWithShape="1">
+          <a:blip r:embed="rId4"/>
+          <a:srcRect l="14395" r="22624" b="-1"/>
+          <a:stretch/>
+        </p:blipFill>
+        <p:spPr>
+          <a:xfrm>
+            <a:off x="4171867" y="2108199"/>
+            <a:ext cx="3044106" cy="3760885"/>
+          </a:xfrm>
+          <a:prstGeom prst="rect">
+            <a:avLst/>
+          </a:prstGeom>
+        </p:spPr>
+      </p:pic>
+      <p:sp>
+        <p:nvSpPr>
+          <p:cNvPr id="3" name="Content Placeholder 2">
+            <a:extLst>
+              <a:ext uri="{FF2B5EF4-FFF2-40B4-BE49-F238E27FC236}">
+                <a16:creationId xmlns:a16="http://schemas.microsoft.com/office/drawing/2014/main" id="{6311D31F-A605-BD54-9B7F-357428D58B88}"/>
+              </a:ext>
+            </a:extLst>
+          </p:cNvPr>
+          <p:cNvSpPr>
+            <a:spLocks noGrp="1"/>
+          </p:cNvSpPr>
+          <p:nvPr>
+            <p:ph idx="1"/>
+          </p:nvPr>
+        </p:nvSpPr>
+        <p:spPr>
+          <a:xfrm>
+            <a:off x="7537704" y="2108201"/>
+            <a:ext cx="3557016" cy="3760891"/>
+          </a:xfrm>
+        </p:spPr>
+        <p:txBody>
+          <a:bodyPr>
+            <a:normAutofit/>
+          </a:bodyPr>
+          <a:lstStyle/>
+          <a:p>
+            <a:pPr marL="0" indent="0">
+              <a:buNone/>
+            </a:pPr>
+            <a:r>
+              <a:rPr lang="en-GB" dirty="0"/>
+              <a:t>Our marketplace was built to be flexible and modular at heart. </a:t>
+            </a:r>
+          </a:p>
+          <a:p>
+            <a:pPr marL="0" indent="0">
+              <a:buNone/>
+            </a:pPr>
+            <a:r>
+              <a:rPr lang="en-GB" dirty="0"/>
+              <a:t>Our functionality was split into </a:t>
+            </a:r>
+            <a:r>
+              <a:rPr lang="en-GB" b="1" dirty="0"/>
+              <a:t>4 main applications</a:t>
+            </a:r>
+            <a:r>
+              <a:rPr lang="en-GB" dirty="0"/>
+              <a:t>, allowing for convenient reusability and extensibility.</a:t>
+            </a:r>
+          </a:p>
+          <a:p>
+            <a:pPr>
+              <a:buFont typeface="Wingdings" panose="05000000000000000000" pitchFamily="2" charset="2"/>
+              <a:buChar char="v"/>
+            </a:pPr>
+            <a:endParaRPr lang="en-GB" dirty="0"/>
+          </a:p>
+        </p:txBody>
+      </p:sp>
+      <p:sp>
+        <p:nvSpPr>
+          <p:cNvPr id="100" name="Rectangle 99">
+            <a:extLst>
+              <a:ext uri="{FF2B5EF4-FFF2-40B4-BE49-F238E27FC236}">
+                <a16:creationId xmlns:a16="http://schemas.microsoft.com/office/drawing/2014/main" id="{DB148495-5F82-48E2-A76C-C8E1C8949940}"/>
+              </a:ext>
+              <a:ext uri="{C183D7F6-B498-43B3-948B-1728B52AA6E4}">
+                <adec:decorative xmlns:adec="http://schemas.microsoft.com/office/drawing/2017/decorative" val="1"/>
+              </a:ext>
+            </a:extLst>
+          </p:cNvPr>
+          <p:cNvSpPr>
+            <a:spLocks noGrp="1" noRot="1" noChangeAspect="1" noMove="1" noResize="1" noEditPoints="1" noAdjustHandles="1" noChangeArrowheads="1" noChangeShapeType="1" noTextEdit="1"/>
+          </p:cNvSpPr>
+          <p:nvPr>
+            <p:extLst>
+              <p:ext uri="{386F3935-93C4-4BCD-93E2-E3B085C9AB24}">
+                <p16:designElem xmlns:p16="http://schemas.microsoft.com/office/powerpoint/2015/main" val="1"/>
+              </p:ext>
+            </p:extLst>
+          </p:nvPr>
+        </p:nvSpPr>
+        <p:spPr>
+          <a:xfrm>
+            <a:off x="3175" y="6400800"/>
+            <a:ext cx="12188825" cy="457200"/>
+          </a:xfrm>
+          <a:prstGeom prst="rect">
+            <a:avLst/>
+          </a:prstGeom>
+          <a:solidFill>
+            <a:srgbClr val="262626"/>
+          </a:solidFill>
+          <a:ln>
+            <a:noFill/>
+          </a:ln>
+        </p:spPr>
+        <p:style>
+          <a:lnRef idx="2">
+            <a:schemeClr val="accent1">
+              <a:shade val="50000"/>
+            </a:schemeClr>
+          </a:lnRef>
+          <a:fillRef idx="1">
+            <a:schemeClr val="accent1"/>
+          </a:fillRef>
+          <a:effectRef idx="0">
+            <a:schemeClr val="accent1"/>
+          </a:effectRef>
+          <a:fontRef idx="minor">
+            <a:schemeClr val="lt1"/>
+          </a:fontRef>
+        </p:style>
+      </p:sp>
+    </p:spTree>
+    <p:extLst>
+      <p:ext uri="{BB962C8B-B14F-4D97-AF65-F5344CB8AC3E}">
+        <p14:creationId xmlns:p14="http://schemas.microsoft.com/office/powerpoint/2010/main" val="296460774"/>
+      </p:ext>
+    </p:extLst>
+  </p:cSld>
+  <p:clrMapOvr>
+    <a:masterClrMapping/>
+  </p:clrMapOvr>
+</p:sld>
+</file>
+
+<file path=ppt/slides/slide13.xml><?xml version="1.0" encoding="utf-8"?>
+<p:sld xmlns:a="http://schemas.openxmlformats.org/drawingml/2006/main" xmlns:r="http://schemas.openxmlformats.org/officeDocument/2006/relationships" xmlns:p="http://schemas.openxmlformats.org/presentationml/2006/main">
+  <p:cSld>
+    <p:bg>
+      <p:bgPr>
+        <a:solidFill>
+          <a:schemeClr val="bg1">
+            <a:lumMod val="95000"/>
+          </a:schemeClr>
+        </a:solidFill>
+        <a:effectLst/>
+      </p:bgPr>
+    </p:bg>
+    <p:spTree>
+      <p:nvGrpSpPr>
+        <p:cNvPr id="1" name=""/>
+        <p:cNvGrpSpPr/>
+        <p:nvPr/>
+      </p:nvGrpSpPr>
+      <p:grpSpPr>
+        <a:xfrm>
+          <a:off x="0" y="0"/>
+          <a:ext cx="0" cy="0"/>
+          <a:chOff x="0" y="0"/>
+          <a:chExt cx="0" cy="0"/>
+        </a:xfrm>
+      </p:grpSpPr>
+      <p:sp useBgFill="1">
+        <p:nvSpPr>
+          <p:cNvPr id="105" name="Rectangle 104">
+            <a:extLst>
+              <a:ext uri="{FF2B5EF4-FFF2-40B4-BE49-F238E27FC236}">
+                <a16:creationId xmlns:a16="http://schemas.microsoft.com/office/drawing/2014/main" id="{5E0A8391-2737-4F1C-B27A-C44629DB4D33}"/>
+              </a:ext>
+              <a:ext uri="{C183D7F6-B498-43B3-948B-1728B52AA6E4}">
+                <adec:decorative xmlns:adec="http://schemas.microsoft.com/office/drawing/2017/decorative" val="1"/>
+              </a:ext>
+            </a:extLst>
+          </p:cNvPr>
+          <p:cNvSpPr>
+            <a:spLocks noGrp="1" noRot="1" noChangeAspect="1" noMove="1" noResize="1" noEditPoints="1" noAdjustHandles="1" noChangeArrowheads="1" noChangeShapeType="1" noTextEdit="1"/>
+          </p:cNvSpPr>
+          <p:nvPr>
+            <p:extLst>
+              <p:ext uri="{386F3935-93C4-4BCD-93E2-E3B085C9AB24}">
+                <p16:designElem xmlns:p16="http://schemas.microsoft.com/office/powerpoint/2015/main" val="1"/>
+              </p:ext>
+            </p:extLst>
+          </p:nvPr>
+        </p:nvSpPr>
+        <p:spPr>
+          <a:xfrm>
+            <a:off x="0" y="0"/>
+            <a:ext cx="12192001" cy="6858000"/>
+          </a:xfrm>
+          <a:prstGeom prst="rect">
+            <a:avLst/>
+          </a:prstGeom>
+          <a:ln>
+            <a:noFill/>
+          </a:ln>
+        </p:spPr>
+        <p:style>
+          <a:lnRef idx="2">
+            <a:schemeClr val="accent1">
+              <a:shade val="50000"/>
+            </a:schemeClr>
+          </a:lnRef>
+          <a:fillRef idx="1">
+            <a:schemeClr val="accent1"/>
+          </a:fillRef>
+          <a:effectRef idx="0">
+            <a:schemeClr val="accent1"/>
+          </a:effectRef>
+          <a:fontRef idx="minor">
+            <a:schemeClr val="lt1"/>
+          </a:fontRef>
+        </p:style>
+        <p:txBody>
+          <a:bodyPr rtlCol="0" anchor="ctr"/>
+          <a:lstStyle/>
+          <a:p>
+            <a:pPr algn="ctr"/>
+            <a:endParaRPr lang="en-US"/>
+          </a:p>
+        </p:txBody>
+      </p:sp>
+      <p:sp>
+        <p:nvSpPr>
+          <p:cNvPr id="2" name="Title 1">
+            <a:extLst>
+              <a:ext uri="{FF2B5EF4-FFF2-40B4-BE49-F238E27FC236}">
+                <a16:creationId xmlns:a16="http://schemas.microsoft.com/office/drawing/2014/main" id="{2B44E995-5C74-F080-87CB-013DF8B69CD8}"/>
+              </a:ext>
+            </a:extLst>
+          </p:cNvPr>
+          <p:cNvSpPr>
+            <a:spLocks noGrp="1"/>
+          </p:cNvSpPr>
+          <p:nvPr>
+            <p:ph type="title"/>
+          </p:nvPr>
+        </p:nvSpPr>
+        <p:spPr>
+          <a:xfrm>
+            <a:off x="642256" y="642257"/>
+            <a:ext cx="3417677" cy="5226837"/>
+          </a:xfrm>
+        </p:spPr>
+        <p:txBody>
+          <a:bodyPr anchor="t">
+            <a:normAutofit/>
+          </a:bodyPr>
+          <a:lstStyle/>
+          <a:p>
+            <a:r>
+              <a:rPr lang="en-GB" dirty="0"/>
+              <a:t>Technologies Used:</a:t>
+            </a:r>
+            <a:endParaRPr lang="en-CY" dirty="0"/>
+          </a:p>
+        </p:txBody>
+      </p:sp>
+      <p:sp>
+        <p:nvSpPr>
+          <p:cNvPr id="3" name="Content Placeholder 2">
+            <a:extLst>
+              <a:ext uri="{FF2B5EF4-FFF2-40B4-BE49-F238E27FC236}">
+                <a16:creationId xmlns:a16="http://schemas.microsoft.com/office/drawing/2014/main" id="{6311D31F-A605-BD54-9B7F-357428D58B88}"/>
+              </a:ext>
+            </a:extLst>
+          </p:cNvPr>
+          <p:cNvSpPr>
+            <a:spLocks noGrp="1"/>
+          </p:cNvSpPr>
+          <p:nvPr>
+            <p:ph idx="1"/>
+          </p:nvPr>
+        </p:nvSpPr>
+        <p:spPr>
+          <a:xfrm>
+            <a:off x="4719393" y="764178"/>
+            <a:ext cx="6847117" cy="2537672"/>
+          </a:xfrm>
+        </p:spPr>
+        <p:txBody>
+          <a:bodyPr>
+            <a:normAutofit/>
+          </a:bodyPr>
+          <a:lstStyle/>
+          <a:p>
+            <a:pPr>
+              <a:lnSpc>
+                <a:spcPct val="100000"/>
+              </a:lnSpc>
+              <a:buFont typeface="Wingdings" panose="05000000000000000000" pitchFamily="2" charset="2"/>
+              <a:buChar char="v"/>
+            </a:pPr>
+            <a:r>
+              <a:rPr lang="en-GB" sz="1700" b="1" dirty="0"/>
+              <a:t>Python</a:t>
+            </a:r>
+            <a:r>
+              <a:rPr lang="en-GB" sz="1700" dirty="0"/>
+              <a:t> with </a:t>
+            </a:r>
+            <a:r>
+              <a:rPr lang="en-GB" sz="1700" b="1" dirty="0"/>
+              <a:t>Django </a:t>
+            </a:r>
+            <a:r>
+              <a:rPr lang="en-GB" sz="1700" dirty="0"/>
+              <a:t>Framework</a:t>
+            </a:r>
+            <a:r>
+              <a:rPr lang="en-GB" sz="1700" b="1" dirty="0"/>
+              <a:t> </a:t>
+            </a:r>
+            <a:r>
+              <a:rPr lang="en-GB" sz="1700" dirty="0"/>
+              <a:t>for the general development of the application, particularly for back end and session </a:t>
+            </a:r>
+            <a:r>
+              <a:rPr lang="en-GB" sz="1700" b="1" dirty="0"/>
+              <a:t>cookies</a:t>
+            </a:r>
+            <a:r>
+              <a:rPr lang="en-GB" sz="1700" dirty="0"/>
+              <a:t>.</a:t>
+            </a:r>
+          </a:p>
+          <a:p>
+            <a:pPr>
+              <a:lnSpc>
+                <a:spcPct val="100000"/>
+              </a:lnSpc>
+              <a:buFont typeface="Wingdings" panose="05000000000000000000" pitchFamily="2" charset="2"/>
+              <a:buChar char="v"/>
+            </a:pPr>
+            <a:r>
+              <a:rPr lang="en-GB" sz="1700" b="1" dirty="0"/>
+              <a:t>HTML</a:t>
+            </a:r>
+            <a:r>
+              <a:rPr lang="en-GB" sz="1700" dirty="0"/>
+              <a:t> for the creation of templates.</a:t>
+            </a:r>
+          </a:p>
+          <a:p>
+            <a:pPr>
+              <a:lnSpc>
+                <a:spcPct val="100000"/>
+              </a:lnSpc>
+              <a:buFont typeface="Wingdings" panose="05000000000000000000" pitchFamily="2" charset="2"/>
+              <a:buChar char="v"/>
+            </a:pPr>
+            <a:r>
+              <a:rPr lang="en-GB" sz="1700" b="1" dirty="0"/>
+              <a:t>CSS</a:t>
+            </a:r>
+            <a:r>
+              <a:rPr lang="en-GB" sz="1700" dirty="0"/>
+              <a:t> with the </a:t>
+            </a:r>
+            <a:r>
+              <a:rPr lang="en-GB" sz="1700" b="1" dirty="0"/>
+              <a:t>Bootstrap</a:t>
+            </a:r>
+            <a:r>
+              <a:rPr lang="en-GB" sz="1700" dirty="0"/>
+              <a:t> framework to build a visually appealing front end upon said templates.</a:t>
+            </a:r>
+          </a:p>
+          <a:p>
+            <a:pPr>
+              <a:lnSpc>
+                <a:spcPct val="100000"/>
+              </a:lnSpc>
+              <a:buFont typeface="Wingdings" panose="05000000000000000000" pitchFamily="2" charset="2"/>
+              <a:buChar char="v"/>
+            </a:pPr>
+            <a:r>
+              <a:rPr lang="en-GB" sz="1700" b="1" dirty="0"/>
+              <a:t>JavaScript</a:t>
+            </a:r>
+            <a:r>
+              <a:rPr lang="en-GB" sz="1700" dirty="0"/>
+              <a:t> for some fancier front end work in the Index, Logout and About us pages.</a:t>
+            </a:r>
+            <a:endParaRPr lang="en-GB" sz="1700" b="1" dirty="0"/>
+          </a:p>
+          <a:p>
+            <a:pPr>
+              <a:lnSpc>
+                <a:spcPct val="100000"/>
+              </a:lnSpc>
+              <a:buFont typeface="Wingdings" panose="05000000000000000000" pitchFamily="2" charset="2"/>
+              <a:buChar char="v"/>
+            </a:pPr>
+            <a:endParaRPr lang="en-GB" sz="1700" dirty="0"/>
+          </a:p>
+          <a:p>
+            <a:pPr>
+              <a:lnSpc>
+                <a:spcPct val="100000"/>
+              </a:lnSpc>
+              <a:buFont typeface="Wingdings" panose="05000000000000000000" pitchFamily="2" charset="2"/>
+              <a:buChar char="v"/>
+            </a:pPr>
+            <a:endParaRPr lang="en-GB" sz="1700" dirty="0"/>
+          </a:p>
+        </p:txBody>
+      </p:sp>
+      <p:pic>
+        <p:nvPicPr>
+          <p:cNvPr id="5" name="Picture 4">
+            <a:extLst>
+              <a:ext uri="{FF2B5EF4-FFF2-40B4-BE49-F238E27FC236}">
+                <a16:creationId xmlns:a16="http://schemas.microsoft.com/office/drawing/2014/main" id="{A9CB7291-6358-2F1A-E826-02DBC039EF61}"/>
+              </a:ext>
+            </a:extLst>
+          </p:cNvPr>
+          <p:cNvPicPr>
+            <a:picLocks noChangeAspect="1"/>
+          </p:cNvPicPr>
+          <p:nvPr/>
+        </p:nvPicPr>
+        <p:blipFill>
+          <a:blip r:embed="rId3"/>
+          <a:stretch>
+            <a:fillRect/>
+          </a:stretch>
+        </p:blipFill>
+        <p:spPr>
+          <a:xfrm>
+            <a:off x="5181600" y="3794419"/>
+            <a:ext cx="5304722" cy="2113812"/>
+          </a:xfrm>
+          <a:prstGeom prst="rect">
+            <a:avLst/>
+          </a:prstGeom>
+        </p:spPr>
+      </p:pic>
+      <p:sp>
+        <p:nvSpPr>
+          <p:cNvPr id="107" name="Rectangle 106">
+            <a:extLst>
+              <a:ext uri="{FF2B5EF4-FFF2-40B4-BE49-F238E27FC236}">
+                <a16:creationId xmlns:a16="http://schemas.microsoft.com/office/drawing/2014/main" id="{ED5EC01C-B438-4398-919E-A345C83EDAC9}"/>
+              </a:ext>
+              <a:ext uri="{C183D7F6-B498-43B3-948B-1728B52AA6E4}">
+                <adec:decorative xmlns:adec="http://schemas.microsoft.com/office/drawing/2017/decorative" val="1"/>
+              </a:ext>
+            </a:extLst>
+          </p:cNvPr>
+          <p:cNvSpPr>
+            <a:spLocks noGrp="1" noRot="1" noChangeAspect="1" noMove="1" noResize="1" noEditPoints="1" noAdjustHandles="1" noChangeArrowheads="1" noChangeShapeType="1" noTextEdit="1"/>
+          </p:cNvSpPr>
+          <p:nvPr>
+            <p:extLst>
+              <p:ext uri="{386F3935-93C4-4BCD-93E2-E3B085C9AB24}">
+                <p16:designElem xmlns:p16="http://schemas.microsoft.com/office/powerpoint/2015/main" val="1"/>
+              </p:ext>
+            </p:extLst>
+          </p:nvPr>
+        </p:nvSpPr>
+        <p:spPr>
+          <a:xfrm>
+            <a:off x="0" y="6400800"/>
+            <a:ext cx="12192000" cy="457200"/>
+          </a:xfrm>
+          <a:prstGeom prst="rect">
+            <a:avLst/>
+          </a:prstGeom>
+          <a:solidFill>
+            <a:srgbClr val="262626"/>
+          </a:solidFill>
+          <a:ln>
+            <a:noFill/>
+          </a:ln>
+        </p:spPr>
+        <p:style>
+          <a:lnRef idx="2">
+            <a:schemeClr val="accent1">
+              <a:shade val="50000"/>
+            </a:schemeClr>
+          </a:lnRef>
+          <a:fillRef idx="1">
+            <a:schemeClr val="accent1"/>
+          </a:fillRef>
+          <a:effectRef idx="0">
+            <a:schemeClr val="accent1"/>
+          </a:effectRef>
+          <a:fontRef idx="minor">
+            <a:schemeClr val="lt1"/>
+          </a:fontRef>
+        </p:style>
+      </p:sp>
+    </p:spTree>
+    <p:extLst>
+      <p:ext uri="{BB962C8B-B14F-4D97-AF65-F5344CB8AC3E}">
+        <p14:creationId xmlns:p14="http://schemas.microsoft.com/office/powerpoint/2010/main" val="420911254"/>
+      </p:ext>
+    </p:extLst>
+  </p:cSld>
+  <p:clrMapOvr>
+    <a:masterClrMapping/>
+  </p:clrMapOvr>
+</p:sld>
+</file>
+
+<file path=ppt/slides/slide14.xml><?xml version="1.0" encoding="utf-8"?>
+<p:sld xmlns:a="http://schemas.openxmlformats.org/drawingml/2006/main" xmlns:r="http://schemas.openxmlformats.org/officeDocument/2006/relationships" xmlns:p="http://schemas.openxmlformats.org/presentationml/2006/main">
+  <p:cSld>
+    <p:bg>
+      <p:bgPr>
+        <a:solidFill>
+          <a:schemeClr val="bg1">
+            <a:lumMod val="95000"/>
+          </a:schemeClr>
+        </a:solidFill>
+        <a:effectLst/>
+      </p:bgPr>
+    </p:bg>
+    <p:spTree>
+      <p:nvGrpSpPr>
+        <p:cNvPr id="1" name=""/>
+        <p:cNvGrpSpPr/>
+        <p:nvPr/>
+      </p:nvGrpSpPr>
+      <p:grpSpPr>
+        <a:xfrm>
+          <a:off x="0" y="0"/>
+          <a:ext cx="0" cy="0"/>
+          <a:chOff x="0" y="0"/>
+          <a:chExt cx="0" cy="0"/>
+        </a:xfrm>
+      </p:grpSpPr>
+      <p:sp useBgFill="1">
+        <p:nvSpPr>
+          <p:cNvPr id="107" name="Rectangle 106">
+            <a:extLst>
+              <a:ext uri="{FF2B5EF4-FFF2-40B4-BE49-F238E27FC236}">
+                <a16:creationId xmlns:a16="http://schemas.microsoft.com/office/drawing/2014/main" id="{13BCCAE5-A35B-4B66-A4A7-E23C34A403A4}"/>
+              </a:ext>
+              <a:ext uri="{C183D7F6-B498-43B3-948B-1728B52AA6E4}">
+                <adec:decorative xmlns:adec="http://schemas.microsoft.com/office/drawing/2017/decorative" val="1"/>
+              </a:ext>
+            </a:extLst>
+          </p:cNvPr>
+          <p:cNvSpPr>
+            <a:spLocks noGrp="1" noRot="1" noChangeAspect="1" noMove="1" noResize="1" noEditPoints="1" noAdjustHandles="1" noChangeArrowheads="1" noChangeShapeType="1" noTextEdit="1"/>
+          </p:cNvSpPr>
+          <p:nvPr>
+            <p:extLst>
+              <p:ext uri="{386F3935-93C4-4BCD-93E2-E3B085C9AB24}">
+                <p16:designElem xmlns:p16="http://schemas.microsoft.com/office/powerpoint/2015/main" val="1"/>
+              </p:ext>
+            </p:extLst>
+          </p:nvPr>
+        </p:nvSpPr>
+        <p:spPr>
+          <a:xfrm>
+            <a:off x="0" y="0"/>
+            <a:ext cx="12192000" cy="6858000"/>
+          </a:xfrm>
+          <a:prstGeom prst="rect">
+            <a:avLst/>
+          </a:prstGeom>
+          <a:ln>
+            <a:noFill/>
+          </a:ln>
+        </p:spPr>
+        <p:style>
+          <a:lnRef idx="2">
+            <a:schemeClr val="accent1">
+              <a:shade val="50000"/>
+            </a:schemeClr>
+          </a:lnRef>
+          <a:fillRef idx="1">
+            <a:schemeClr val="accent1"/>
+          </a:fillRef>
+          <a:effectRef idx="0">
+            <a:schemeClr val="accent1"/>
+          </a:effectRef>
+          <a:fontRef idx="minor">
+            <a:schemeClr val="lt1"/>
+          </a:fontRef>
+        </p:style>
+        <p:txBody>
+          <a:bodyPr rtlCol="0" anchor="ctr"/>
+          <a:lstStyle/>
+          <a:p>
+            <a:pPr algn="ctr"/>
+            <a:endParaRPr lang="en-US"/>
+          </a:p>
+        </p:txBody>
+      </p:sp>
+      <p:sp>
+        <p:nvSpPr>
+          <p:cNvPr id="2" name="Title 1">
+            <a:extLst>
+              <a:ext uri="{FF2B5EF4-FFF2-40B4-BE49-F238E27FC236}">
+                <a16:creationId xmlns:a16="http://schemas.microsoft.com/office/drawing/2014/main" id="{2B44E995-5C74-F080-87CB-013DF8B69CD8}"/>
+              </a:ext>
+            </a:extLst>
+          </p:cNvPr>
+          <p:cNvSpPr>
+            <a:spLocks noGrp="1"/>
+          </p:cNvSpPr>
+          <p:nvPr>
+            <p:ph type="title"/>
+          </p:nvPr>
+        </p:nvSpPr>
+        <p:spPr>
+          <a:xfrm>
+            <a:off x="1036320" y="286603"/>
+            <a:ext cx="10058400" cy="1450757"/>
+          </a:xfrm>
+        </p:spPr>
+        <p:txBody>
+          <a:bodyPr>
+            <a:normAutofit/>
+          </a:bodyPr>
+          <a:lstStyle/>
+          <a:p>
+            <a:r>
+              <a:rPr lang="en-GB" dirty="0"/>
+              <a:t>Contributions</a:t>
+            </a:r>
+            <a:endParaRPr lang="en-CY" dirty="0"/>
+          </a:p>
+        </p:txBody>
+      </p:sp>
+      <p:cxnSp>
+        <p:nvCxnSpPr>
+          <p:cNvPr id="109" name="Straight Connector 108">
+            <a:extLst>
+              <a:ext uri="{FF2B5EF4-FFF2-40B4-BE49-F238E27FC236}">
+                <a16:creationId xmlns:a16="http://schemas.microsoft.com/office/drawing/2014/main" id="{6987BDFB-DE64-4B56-B44F-45FAE19FA94E}"/>
+              </a:ext>
+              <a:ext uri="{C183D7F6-B498-43B3-948B-1728B52AA6E4}">
+                <adec:decorative xmlns:adec="http://schemas.microsoft.com/office/drawing/2017/decorative" val="1"/>
+              </a:ext>
+            </a:extLst>
+          </p:cNvPr>
+          <p:cNvCxnSpPr>
+            <a:cxnSpLocks noGrp="1" noRot="1" noChangeAspect="1" noMove="1" noResize="1" noEditPoints="1" noAdjustHandles="1" noChangeArrowheads="1" noChangeShapeType="1"/>
+          </p:cNvCxnSpPr>
+          <p:nvPr>
+            <p:extLst>
+              <p:ext uri="{386F3935-93C4-4BCD-93E2-E3B085C9AB24}">
+                <p16:designElem xmlns:p16="http://schemas.microsoft.com/office/powerpoint/2015/main" val="1"/>
+              </p:ext>
+            </p:extLst>
+          </p:nvPr>
+        </p:nvCxnSpPr>
+        <p:spPr>
+          <a:xfrm>
+            <a:off x="1106573" y="1895846"/>
+            <a:ext cx="9784080" cy="0"/>
+          </a:xfrm>
+          <a:prstGeom prst="line">
+            <a:avLst/>
+          </a:prstGeom>
+          <a:ln w="12700">
+            <a:solidFill>
+              <a:schemeClr val="tx1">
+                <a:lumMod val="75000"/>
+                <a:lumOff val="25000"/>
+              </a:schemeClr>
+            </a:solidFill>
+          </a:ln>
+        </p:spPr>
+        <p:style>
+          <a:lnRef idx="1">
+            <a:schemeClr val="accent1"/>
+          </a:lnRef>
+          <a:fillRef idx="0">
+            <a:schemeClr val="accent1"/>
+          </a:fillRef>
+          <a:effectRef idx="0">
+            <a:schemeClr val="accent1"/>
+          </a:effectRef>
+          <a:fontRef idx="minor">
+            <a:schemeClr val="tx1"/>
+          </a:fontRef>
+        </p:style>
+      </p:cxnSp>
+      <p:pic>
+        <p:nvPicPr>
+          <p:cNvPr id="104" name="Graphic 103" descr="Robot">
+            <a:extLst>
+              <a:ext uri="{FF2B5EF4-FFF2-40B4-BE49-F238E27FC236}">
+                <a16:creationId xmlns:a16="http://schemas.microsoft.com/office/drawing/2014/main" id="{708FC6F7-EC33-B8E8-A15E-F0D670755B7A}"/>
+              </a:ext>
+            </a:extLst>
+          </p:cNvPr>
+          <p:cNvPicPr>
+            <a:picLocks noChangeAspect="1"/>
+          </p:cNvPicPr>
+          <p:nvPr/>
+        </p:nvPicPr>
+        <p:blipFill>
+          <a:blip r:embed="rId3">
+            <a:extLst>
+              <a:ext uri="{28A0092B-C50C-407E-A947-70E740481C1C}">
+                <a14:useLocalDpi xmlns:a14="http://schemas.microsoft.com/office/drawing/2010/main" val="0"/>
+              </a:ext>
+              <a:ext uri="{96DAC541-7B7A-43D3-8B79-37D633B846F1}">
+                <asvg:svgBlip xmlns:asvg="http://schemas.microsoft.com/office/drawing/2016/SVG/main" r:embed="rId4"/>
+              </a:ext>
+            </a:extLst>
+          </a:blip>
+          <a:stretch>
+            <a:fillRect/>
+          </a:stretch>
+        </p:blipFill>
+        <p:spPr>
+          <a:xfrm>
+            <a:off x="1031509" y="2472903"/>
+            <a:ext cx="3031484" cy="3031484"/>
+          </a:xfrm>
+          <a:prstGeom prst="rect">
+            <a:avLst/>
+          </a:prstGeom>
+        </p:spPr>
+      </p:pic>
+      <p:sp>
+        <p:nvSpPr>
+          <p:cNvPr id="3" name="Content Placeholder 2">
+            <a:extLst>
+              <a:ext uri="{FF2B5EF4-FFF2-40B4-BE49-F238E27FC236}">
+                <a16:creationId xmlns:a16="http://schemas.microsoft.com/office/drawing/2014/main" id="{6311D31F-A605-BD54-9B7F-357428D58B88}"/>
+              </a:ext>
+            </a:extLst>
+          </p:cNvPr>
+          <p:cNvSpPr>
+            <a:spLocks noGrp="1"/>
+          </p:cNvSpPr>
+          <p:nvPr>
+            <p:ph idx="1"/>
+          </p:nvPr>
+        </p:nvSpPr>
+        <p:spPr>
+          <a:xfrm>
+            <a:off x="4706460" y="2108201"/>
+            <a:ext cx="6388260" cy="3760891"/>
+          </a:xfrm>
+        </p:spPr>
+        <p:txBody>
+          <a:bodyPr>
+            <a:normAutofit/>
+          </a:bodyPr>
+          <a:lstStyle/>
+          <a:p>
+            <a:pPr>
+              <a:lnSpc>
+                <a:spcPct val="100000"/>
+              </a:lnSpc>
+              <a:buFont typeface="Wingdings" panose="05000000000000000000" pitchFamily="2" charset="2"/>
+              <a:buChar char="v"/>
+            </a:pPr>
+            <a:r>
+              <a:rPr lang="en-GB" sz="1900" u="sng" dirty="0"/>
+              <a:t>Andrei: </a:t>
+            </a:r>
+            <a:r>
+              <a:rPr lang="en-GB" sz="1900" dirty="0"/>
+              <a:t>Car database, search function, filtering, populating script implementation.</a:t>
+            </a:r>
+          </a:p>
+          <a:p>
+            <a:pPr>
+              <a:lnSpc>
+                <a:spcPct val="100000"/>
+              </a:lnSpc>
+              <a:buFont typeface="Wingdings" panose="05000000000000000000" pitchFamily="2" charset="2"/>
+              <a:buChar char="v"/>
+            </a:pPr>
+            <a:r>
+              <a:rPr lang="en-GB" sz="1900" u="sng" dirty="0"/>
+              <a:t>Antonis</a:t>
+            </a:r>
+            <a:r>
+              <a:rPr lang="en-GB" sz="1900" dirty="0"/>
+              <a:t>: Core pages &amp; requirements addition, information polishing, cookies implementation presentation slides &amp; video</a:t>
+            </a:r>
+          </a:p>
+          <a:p>
+            <a:pPr>
+              <a:lnSpc>
+                <a:spcPct val="100000"/>
+              </a:lnSpc>
+              <a:buFont typeface="Wingdings" panose="05000000000000000000" pitchFamily="2" charset="2"/>
+              <a:buChar char="v"/>
+            </a:pPr>
+            <a:r>
+              <a:rPr lang="en-GB" sz="1900" u="sng" dirty="0"/>
+              <a:t>Ali</a:t>
+            </a:r>
+            <a:r>
+              <a:rPr lang="en-GB" sz="1900" dirty="0"/>
+              <a:t>: Car app development, messaging app implementation, car database assistance, front end work.</a:t>
+            </a:r>
+          </a:p>
+          <a:p>
+            <a:pPr>
+              <a:lnSpc>
+                <a:spcPct val="100000"/>
+              </a:lnSpc>
+              <a:buFont typeface="Wingdings" panose="05000000000000000000" pitchFamily="2" charset="2"/>
+              <a:buChar char="v"/>
+            </a:pPr>
+            <a:r>
+              <a:rPr lang="en-GB" sz="1900" u="sng" dirty="0"/>
+              <a:t>Satveer</a:t>
+            </a:r>
+            <a:r>
+              <a:rPr lang="en-GB" sz="1900" dirty="0"/>
+              <a:t> : Front end work with Bootstrap, unit testing, accounts app implementation, general maintenance.</a:t>
+            </a:r>
+          </a:p>
+          <a:p>
+            <a:pPr>
+              <a:lnSpc>
+                <a:spcPct val="100000"/>
+              </a:lnSpc>
+              <a:buFont typeface="Wingdings" panose="05000000000000000000" pitchFamily="2" charset="2"/>
+              <a:buChar char="v"/>
+            </a:pPr>
+            <a:r>
+              <a:rPr lang="en-GB" sz="1900" u="sng" dirty="0"/>
+              <a:t>Mostafa</a:t>
+            </a:r>
+            <a:r>
+              <a:rPr lang="en-GB" sz="1900" dirty="0"/>
+              <a:t>: Front end heavy-lifting and maintenance with templates &amp; CSS, fixes in back end.</a:t>
+            </a:r>
+          </a:p>
+          <a:p>
+            <a:pPr>
+              <a:lnSpc>
+                <a:spcPct val="100000"/>
+              </a:lnSpc>
+              <a:buFont typeface="Wingdings" panose="05000000000000000000" pitchFamily="2" charset="2"/>
+              <a:buChar char="v"/>
+            </a:pPr>
+            <a:endParaRPr lang="en-GB" sz="1900" dirty="0"/>
+          </a:p>
+          <a:p>
+            <a:pPr>
+              <a:lnSpc>
+                <a:spcPct val="100000"/>
+              </a:lnSpc>
+              <a:buFont typeface="Wingdings" panose="05000000000000000000" pitchFamily="2" charset="2"/>
+              <a:buChar char="v"/>
+            </a:pPr>
+            <a:endParaRPr lang="en-GB" sz="1900" dirty="0"/>
+          </a:p>
+        </p:txBody>
+      </p:sp>
+      <p:sp>
+        <p:nvSpPr>
+          <p:cNvPr id="111" name="Rectangle 110">
+            <a:extLst>
+              <a:ext uri="{FF2B5EF4-FFF2-40B4-BE49-F238E27FC236}">
+                <a16:creationId xmlns:a16="http://schemas.microsoft.com/office/drawing/2014/main" id="{0B2EDFE5-9478-4774-9D3D-FEC7DC7082EF}"/>
+              </a:ext>
+              <a:ext uri="{C183D7F6-B498-43B3-948B-1728B52AA6E4}">
+                <adec:decorative xmlns:adec="http://schemas.microsoft.com/office/drawing/2017/decorative" val="1"/>
+              </a:ext>
+            </a:extLst>
+          </p:cNvPr>
+          <p:cNvSpPr>
+            <a:spLocks noGrp="1" noRot="1" noChangeAspect="1" noMove="1" noResize="1" noEditPoints="1" noAdjustHandles="1" noChangeArrowheads="1" noChangeShapeType="1" noTextEdit="1"/>
+          </p:cNvSpPr>
+          <p:nvPr>
+            <p:extLst>
+              <p:ext uri="{386F3935-93C4-4BCD-93E2-E3B085C9AB24}">
+                <p16:designElem xmlns:p16="http://schemas.microsoft.com/office/powerpoint/2015/main" val="1"/>
+              </p:ext>
+            </p:extLst>
+          </p:nvPr>
+        </p:nvSpPr>
+        <p:spPr>
+          <a:xfrm>
+            <a:off x="0" y="6400800"/>
+            <a:ext cx="12192000" cy="457200"/>
+          </a:xfrm>
+          <a:prstGeom prst="rect">
+            <a:avLst/>
+          </a:prstGeom>
+          <a:solidFill>
+            <a:srgbClr val="262626"/>
+          </a:solidFill>
+          <a:ln>
+            <a:noFill/>
+          </a:ln>
+        </p:spPr>
+        <p:style>
+          <a:lnRef idx="2">
+            <a:schemeClr val="accent1">
+              <a:shade val="50000"/>
+            </a:schemeClr>
+          </a:lnRef>
+          <a:fillRef idx="1">
+            <a:schemeClr val="accent1"/>
+          </a:fillRef>
+          <a:effectRef idx="0">
+            <a:schemeClr val="accent1"/>
+          </a:effectRef>
+          <a:fontRef idx="minor">
+            <a:schemeClr val="lt1"/>
+          </a:fontRef>
+        </p:style>
+      </p:sp>
+    </p:spTree>
+    <p:extLst>
+      <p:ext uri="{BB962C8B-B14F-4D97-AF65-F5344CB8AC3E}">
+        <p14:creationId xmlns:p14="http://schemas.microsoft.com/office/powerpoint/2010/main" val="222270723"/>
+      </p:ext>
+    </p:extLst>
+  </p:cSld>
+  <p:clrMapOvr>
+    <a:masterClrMapping/>
+  </p:clrMapOvr>
+</p:sld>
+</file>
+
 <file path=ppt/slides/slide2.xml><?xml version="1.0" encoding="utf-8"?>
 <p:sld xmlns:a="http://schemas.openxmlformats.org/drawingml/2006/main" xmlns:r="http://schemas.openxmlformats.org/officeDocument/2006/relationships" xmlns:p="http://schemas.openxmlformats.org/presentationml/2006/main">
   <p:cSld>
@@ -4839,7 +7432,11 @@
           <a:p>
             <a:r>
               <a:rPr lang="en-GB" dirty="0"/>
-              <a:t>Our aim is to provide an extensive, yet aesthetic platform to aid with the sale and purchase of cars. We aim to target a wide audience, there’s something for just about everyone!</a:t>
+              <a:t>Our aim is to provide an extensive, yet aesthetic platform to aid with the sale and purchase of cars. We aim to target a wide audience, </a:t>
+            </a:r>
+            <a:r>
+              <a:rPr lang="en-GB" i="1" dirty="0"/>
+              <a:t>there’s something for just about everyone!</a:t>
             </a:r>
           </a:p>
           <a:p>
@@ -5155,7 +7752,15 @@
             </a:pPr>
             <a:r>
               <a:rPr lang="en-GB" sz="2400" dirty="0"/>
-              <a:t>Users will have their own account with their details stored, following registration and there is an option to reset their password if forgotten.</a:t>
+              <a:t>Users will have their own account with their details stored, following </a:t>
+            </a:r>
+            <a:r>
+              <a:rPr lang="en-GB" sz="2400" b="1" dirty="0"/>
+              <a:t>registration</a:t>
+            </a:r>
+            <a:r>
+              <a:rPr lang="en-GB" sz="2400" dirty="0"/>
+              <a:t> and there is an option to reset their password if forgotten.</a:t>
             </a:r>
             <a:endParaRPr lang="en-CY" sz="2400" dirty="0"/>
           </a:p>
@@ -5434,7 +8039,15 @@
             </a:pPr>
             <a:r>
               <a:rPr lang="en-GB" dirty="0"/>
-              <a:t>Their profile is highly customizable, details can be edited, and the user can upload an image for their profile from their own device.</a:t>
+              <a:t>Their </a:t>
+            </a:r>
+            <a:r>
+              <a:rPr lang="en-GB" b="1" dirty="0"/>
+              <a:t>profile</a:t>
+            </a:r>
+            <a:r>
+              <a:rPr lang="en-GB" dirty="0"/>
+              <a:t> is highly customizable, details can be edited, and the user can upload an image for their profile from their own device.</a:t>
             </a:r>
             <a:endParaRPr lang="en-CY" dirty="0"/>
           </a:p>
@@ -5760,12 +8373,119 @@
           </a:fontRef>
         </p:style>
       </p:cxnSp>
+      <p:sp>
+        <p:nvSpPr>
+          <p:cNvPr id="3" name="Content Placeholder 2">
+            <a:extLst>
+              <a:ext uri="{FF2B5EF4-FFF2-40B4-BE49-F238E27FC236}">
+                <a16:creationId xmlns:a16="http://schemas.microsoft.com/office/drawing/2014/main" id="{6311D31F-A605-BD54-9B7F-357428D58B88}"/>
+              </a:ext>
+            </a:extLst>
+          </p:cNvPr>
+          <p:cNvSpPr>
+            <a:spLocks noGrp="1"/>
+          </p:cNvSpPr>
+          <p:nvPr>
+            <p:ph idx="1"/>
+          </p:nvPr>
+        </p:nvSpPr>
+        <p:spPr>
+          <a:xfrm>
+            <a:off x="8545455" y="2511533"/>
+            <a:ext cx="3062873" cy="3568127"/>
+          </a:xfrm>
+        </p:spPr>
+        <p:txBody>
+          <a:bodyPr>
+            <a:normAutofit/>
+          </a:bodyPr>
+          <a:lstStyle/>
+          <a:p>
+            <a:pPr marL="0" indent="0">
+              <a:buNone/>
+            </a:pPr>
+            <a:r>
+              <a:rPr lang="en-GB" sz="2100" dirty="0"/>
+              <a:t>Users can </a:t>
+            </a:r>
+            <a:r>
+              <a:rPr lang="en-GB" sz="2100" b="1" dirty="0"/>
+              <a:t>browse cars </a:t>
+            </a:r>
+            <a:r>
+              <a:rPr lang="en-GB" sz="2100" dirty="0"/>
+              <a:t>stored in a database, uploaded by other sellers. according to their individual needs, based on price, brand, condition etc.</a:t>
+            </a:r>
+          </a:p>
+          <a:p>
+            <a:pPr marL="0" indent="0">
+              <a:buNone/>
+            </a:pPr>
+            <a:endParaRPr lang="en-GB" dirty="0"/>
+          </a:p>
+        </p:txBody>
+      </p:sp>
+      <p:sp>
+        <p:nvSpPr>
+          <p:cNvPr id="55" name="Rectangle 54">
+            <a:extLst>
+              <a:ext uri="{FF2B5EF4-FFF2-40B4-BE49-F238E27FC236}">
+                <a16:creationId xmlns:a16="http://schemas.microsoft.com/office/drawing/2014/main" id="{0B2EDFE5-9478-4774-9D3D-FEC7DC7082EF}"/>
+              </a:ext>
+              <a:ext uri="{C183D7F6-B498-43B3-948B-1728B52AA6E4}">
+                <adec:decorative xmlns:adec="http://schemas.microsoft.com/office/drawing/2017/decorative" val="1"/>
+              </a:ext>
+            </a:extLst>
+          </p:cNvPr>
+          <p:cNvSpPr>
+            <a:spLocks noGrp="1" noRot="1" noChangeAspect="1" noMove="1" noResize="1" noEditPoints="1" noAdjustHandles="1" noChangeArrowheads="1" noChangeShapeType="1" noTextEdit="1"/>
+          </p:cNvSpPr>
+          <p:nvPr>
+            <p:extLst>
+              <p:ext uri="{386F3935-93C4-4BCD-93E2-E3B085C9AB24}">
+                <p16:designElem xmlns:p16="http://schemas.microsoft.com/office/powerpoint/2015/main" val="1"/>
+              </p:ext>
+            </p:extLst>
+          </p:nvPr>
+        </p:nvSpPr>
+        <p:spPr>
+          <a:xfrm>
+            <a:off x="0" y="6400800"/>
+            <a:ext cx="12192000" cy="457200"/>
+          </a:xfrm>
+          <a:prstGeom prst="rect">
+            <a:avLst/>
+          </a:prstGeom>
+          <a:solidFill>
+            <a:srgbClr val="262626"/>
+          </a:solidFill>
+          <a:ln>
+            <a:noFill/>
+          </a:ln>
+        </p:spPr>
+        <p:style>
+          <a:lnRef idx="2">
+            <a:schemeClr val="accent1">
+              <a:shade val="50000"/>
+            </a:schemeClr>
+          </a:lnRef>
+          <a:fillRef idx="1">
+            <a:schemeClr val="accent1"/>
+          </a:fillRef>
+          <a:effectRef idx="0">
+            <a:schemeClr val="accent1"/>
+          </a:effectRef>
+          <a:fontRef idx="minor">
+            <a:schemeClr val="lt1"/>
+          </a:fontRef>
+        </p:style>
+      </p:sp>
       <p:pic>
         <p:nvPicPr>
-          <p:cNvPr id="7" name="Picture 6">
-            <a:extLst>
-              <a:ext uri="{FF2B5EF4-FFF2-40B4-BE49-F238E27FC236}">
-                <a16:creationId xmlns:a16="http://schemas.microsoft.com/office/drawing/2014/main" id="{1DAAE229-920F-CF22-8BEC-9531F1C0BE7C}"/>
+          <p:cNvPr id="5" name="Picture 4">
+            <a:extLst>
+              <a:ext uri="{FF2B5EF4-FFF2-40B4-BE49-F238E27FC236}">
+                <a16:creationId xmlns:a16="http://schemas.microsoft.com/office/drawing/2014/main" id="{EFEBB7B2-A8C5-D57D-37C5-387A7D3FAFD3}"/>
               </a:ext>
             </a:extLst>
           </p:cNvPr>
@@ -5782,124 +8502,14 @@
         </p:blipFill>
         <p:spPr>
           <a:xfrm>
-            <a:off x="474917" y="2511533"/>
-            <a:ext cx="7486867" cy="2994745"/>
+            <a:off x="906343" y="2433343"/>
+            <a:ext cx="7329214" cy="3112987"/>
           </a:xfrm>
           <a:prstGeom prst="rect">
             <a:avLst/>
           </a:prstGeom>
         </p:spPr>
       </p:pic>
-      <p:sp>
-        <p:nvSpPr>
-          <p:cNvPr id="3" name="Content Placeholder 2">
-            <a:extLst>
-              <a:ext uri="{FF2B5EF4-FFF2-40B4-BE49-F238E27FC236}">
-                <a16:creationId xmlns:a16="http://schemas.microsoft.com/office/drawing/2014/main" id="{6311D31F-A605-BD54-9B7F-357428D58B88}"/>
-              </a:ext>
-            </a:extLst>
-          </p:cNvPr>
-          <p:cNvSpPr>
-            <a:spLocks noGrp="1"/>
-          </p:cNvSpPr>
-          <p:nvPr>
-            <p:ph idx="1"/>
-          </p:nvPr>
-        </p:nvSpPr>
-        <p:spPr>
-          <a:xfrm>
-            <a:off x="8436700" y="2365513"/>
-            <a:ext cx="3062873" cy="3568127"/>
-          </a:xfrm>
-        </p:spPr>
-        <p:txBody>
-          <a:bodyPr>
-            <a:normAutofit fontScale="92500"/>
-          </a:bodyPr>
-          <a:lstStyle/>
-          <a:p>
-            <a:pPr>
-              <a:buFont typeface="Wingdings" panose="05000000000000000000" pitchFamily="2" charset="2"/>
-              <a:buChar char="v"/>
-            </a:pPr>
-            <a:r>
-              <a:rPr lang="en-GB" dirty="0"/>
-              <a:t>Users can browse cars stored in a database, uploaded by other sellers. according to their individual needs, based on price, brand, condition etc.</a:t>
-            </a:r>
-          </a:p>
-          <a:p>
-            <a:pPr>
-              <a:buFont typeface="Wingdings" panose="05000000000000000000" pitchFamily="2" charset="2"/>
-              <a:buChar char="v"/>
-            </a:pPr>
-            <a:r>
-              <a:rPr lang="en-GB" dirty="0"/>
-              <a:t> If interested and logged in, they can contact the seller of a listing by completing a form of interest.</a:t>
-            </a:r>
-          </a:p>
-          <a:p>
-            <a:pPr marL="0" indent="0">
-              <a:buNone/>
-            </a:pPr>
-            <a:endParaRPr lang="en-GB" dirty="0"/>
-          </a:p>
-        </p:txBody>
-      </p:sp>
-      <p:sp>
-        <p:nvSpPr>
-          <p:cNvPr id="55" name="Rectangle 54">
-            <a:extLst>
-              <a:ext uri="{FF2B5EF4-FFF2-40B4-BE49-F238E27FC236}">
-                <a16:creationId xmlns:a16="http://schemas.microsoft.com/office/drawing/2014/main" id="{0B2EDFE5-9478-4774-9D3D-FEC7DC7082EF}"/>
-              </a:ext>
-              <a:ext uri="{C183D7F6-B498-43B3-948B-1728B52AA6E4}">
-                <adec:decorative xmlns:adec="http://schemas.microsoft.com/office/drawing/2017/decorative" val="1"/>
-              </a:ext>
-            </a:extLst>
-          </p:cNvPr>
-          <p:cNvSpPr>
-            <a:spLocks noGrp="1" noRot="1" noChangeAspect="1" noMove="1" noResize="1" noEditPoints="1" noAdjustHandles="1" noChangeArrowheads="1" noChangeShapeType="1" noTextEdit="1"/>
-          </p:cNvSpPr>
-          <p:nvPr>
-            <p:extLst>
-              <p:ext uri="{386F3935-93C4-4BCD-93E2-E3B085C9AB24}">
-                <p16:designElem xmlns:p16="http://schemas.microsoft.com/office/powerpoint/2015/main" val="1"/>
-              </p:ext>
-            </p:extLst>
-          </p:nvPr>
-        </p:nvSpPr>
-        <p:spPr>
-          <a:xfrm>
-            <a:off x="0" y="6400800"/>
-            <a:ext cx="12192000" cy="457200"/>
-          </a:xfrm>
-          <a:prstGeom prst="rect">
-            <a:avLst/>
-          </a:prstGeom>
-          <a:solidFill>
-            <a:srgbClr val="262626"/>
-          </a:solidFill>
-          <a:ln>
-            <a:noFill/>
-          </a:ln>
-        </p:spPr>
-        <p:style>
-          <a:lnRef idx="2">
-            <a:schemeClr val="accent1">
-              <a:shade val="50000"/>
-            </a:schemeClr>
-          </a:lnRef>
-          <a:fillRef idx="1">
-            <a:schemeClr val="accent1"/>
-          </a:fillRef>
-          <a:effectRef idx="0">
-            <a:schemeClr val="accent1"/>
-          </a:effectRef>
-          <a:fontRef idx="minor">
-            <a:schemeClr val="lt1"/>
-          </a:fontRef>
-        </p:style>
-      </p:sp>
     </p:spTree>
     <p:extLst>
       <p:ext uri="{BB962C8B-B14F-4D97-AF65-F5344CB8AC3E}">
@@ -5942,10 +8552,10 @@
       </p:grpSpPr>
       <p:sp useBgFill="1">
         <p:nvSpPr>
-          <p:cNvPr id="69" name="Rectangle 68">
-            <a:extLst>
-              <a:ext uri="{FF2B5EF4-FFF2-40B4-BE49-F238E27FC236}">
-                <a16:creationId xmlns:a16="http://schemas.microsoft.com/office/drawing/2014/main" id="{F64BBAA4-C62B-4146-B49F-FE4CC4655EE0}"/>
+          <p:cNvPr id="87" name="Rectangle 86">
+            <a:extLst>
+              <a:ext uri="{FF2B5EF4-FFF2-40B4-BE49-F238E27FC236}">
+                <a16:creationId xmlns:a16="http://schemas.microsoft.com/office/drawing/2014/main" id="{08CB54FC-0B2A-4107-9A70-958B90B76585}"/>
               </a:ext>
               <a:ext uri="{C183D7F6-B498-43B3-948B-1728B52AA6E4}">
                 <adec:decorative xmlns:adec="http://schemas.microsoft.com/office/drawing/2017/decorative" val="1"/>
@@ -6018,8 +8628,8 @@
         </p:nvSpPr>
         <p:spPr>
           <a:xfrm>
-            <a:off x="878911" y="643468"/>
-            <a:ext cx="3177847" cy="1674180"/>
+            <a:off x="6411685" y="634946"/>
+            <a:ext cx="5127171" cy="1450757"/>
           </a:xfrm>
         </p:spPr>
         <p:txBody>
@@ -6029,121 +8639,10 @@
           <a:lstStyle/>
           <a:p>
             <a:r>
-              <a:rPr lang="en-GB" sz="4000" dirty="0"/>
+              <a:rPr lang="en-GB"/>
               <a:t>Details</a:t>
             </a:r>
-            <a:endParaRPr lang="en-CY" sz="4000" dirty="0"/>
-          </a:p>
-        </p:txBody>
-      </p:sp>
-      <p:cxnSp>
-        <p:nvCxnSpPr>
-          <p:cNvPr id="71" name="Straight Connector 70">
-            <a:extLst>
-              <a:ext uri="{FF2B5EF4-FFF2-40B4-BE49-F238E27FC236}">
-                <a16:creationId xmlns:a16="http://schemas.microsoft.com/office/drawing/2014/main" id="{EEB57AA8-F021-480C-A9E2-F89913313611}"/>
-              </a:ext>
-              <a:ext uri="{C183D7F6-B498-43B3-948B-1728B52AA6E4}">
-                <adec:decorative xmlns:adec="http://schemas.microsoft.com/office/drawing/2017/decorative" val="1"/>
-              </a:ext>
-            </a:extLst>
-          </p:cNvPr>
-          <p:cNvCxnSpPr>
-            <a:cxnSpLocks noGrp="1" noRot="1" noChangeAspect="1" noMove="1" noResize="1" noEditPoints="1" noAdjustHandles="1" noChangeArrowheads="1" noChangeShapeType="1"/>
-          </p:cNvCxnSpPr>
-          <p:nvPr>
-            <p:extLst>
-              <p:ext uri="{386F3935-93C4-4BCD-93E2-E3B085C9AB24}">
-                <p16:designElem xmlns:p16="http://schemas.microsoft.com/office/powerpoint/2015/main" val="1"/>
-              </p:ext>
-            </p:extLst>
-          </p:nvPr>
-        </p:nvCxnSpPr>
-        <p:spPr>
-          <a:xfrm>
-            <a:off x="962164" y="2478513"/>
-            <a:ext cx="2926080" cy="0"/>
-          </a:xfrm>
-          <a:prstGeom prst="line">
-            <a:avLst/>
-          </a:prstGeom>
-          <a:ln>
-            <a:solidFill>
-              <a:schemeClr val="tx1">
-                <a:lumMod val="75000"/>
-                <a:lumOff val="25000"/>
-              </a:schemeClr>
-            </a:solidFill>
-          </a:ln>
-        </p:spPr>
-        <p:style>
-          <a:lnRef idx="1">
-            <a:schemeClr val="accent1"/>
-          </a:lnRef>
-          <a:fillRef idx="0">
-            <a:schemeClr val="accent1"/>
-          </a:fillRef>
-          <a:effectRef idx="0">
-            <a:schemeClr val="accent1"/>
-          </a:effectRef>
-          <a:fontRef idx="minor">
-            <a:schemeClr val="tx1"/>
-          </a:fontRef>
-        </p:style>
-      </p:cxnSp>
-      <p:sp>
-        <p:nvSpPr>
-          <p:cNvPr id="3" name="Content Placeholder 2">
-            <a:extLst>
-              <a:ext uri="{FF2B5EF4-FFF2-40B4-BE49-F238E27FC236}">
-                <a16:creationId xmlns:a16="http://schemas.microsoft.com/office/drawing/2014/main" id="{6311D31F-A605-BD54-9B7F-357428D58B88}"/>
-              </a:ext>
-            </a:extLst>
-          </p:cNvPr>
-          <p:cNvSpPr>
-            <a:spLocks noGrp="1"/>
-          </p:cNvSpPr>
-          <p:nvPr>
-            <p:ph idx="1"/>
-          </p:nvPr>
-        </p:nvSpPr>
-        <p:spPr>
-          <a:xfrm>
-            <a:off x="858064" y="2639380"/>
-            <a:ext cx="3205049" cy="3229714"/>
-          </a:xfrm>
-        </p:spPr>
-        <p:txBody>
-          <a:bodyPr>
-            <a:normAutofit/>
-          </a:bodyPr>
-          <a:lstStyle/>
-          <a:p>
-            <a:pPr>
-              <a:buFont typeface="Wingdings" panose="05000000000000000000" pitchFamily="2" charset="2"/>
-              <a:buChar char="v"/>
-            </a:pPr>
-            <a:r>
-              <a:rPr lang="en-GB" dirty="0"/>
-              <a:t>If interested, users can click on the car for more details.</a:t>
-            </a:r>
-          </a:p>
-          <a:p>
-            <a:pPr>
-              <a:buFont typeface="Wingdings" panose="05000000000000000000" pitchFamily="2" charset="2"/>
-              <a:buChar char="v"/>
-            </a:pPr>
-            <a:r>
-              <a:rPr lang="en-GB" dirty="0"/>
-              <a:t>From there, the car can be added to a Wishlist, or the user can complete a form of interest to contact the seller</a:t>
-            </a:r>
-          </a:p>
-          <a:p>
-            <a:pPr>
-              <a:buFont typeface="Wingdings" panose="05000000000000000000" pitchFamily="2" charset="2"/>
-              <a:buChar char="v"/>
-            </a:pPr>
-            <a:endParaRPr lang="en-GB" dirty="0"/>
+            <a:endParaRPr lang="en-CY"/>
           </a:p>
         </p:txBody>
       </p:sp>
@@ -6169,20 +8668,137 @@
         </p:blipFill>
         <p:spPr>
           <a:xfrm>
-            <a:off x="5826874" y="504318"/>
-            <a:ext cx="5486215" cy="5225621"/>
+            <a:off x="643192" y="832795"/>
+            <a:ext cx="5115347" cy="4872368"/>
           </a:xfrm>
           <a:prstGeom prst="rect">
             <a:avLst/>
           </a:prstGeom>
         </p:spPr>
       </p:pic>
-      <p:sp>
-        <p:nvSpPr>
-          <p:cNvPr id="73" name="Rectangle 72">
-            <a:extLst>
-              <a:ext uri="{FF2B5EF4-FFF2-40B4-BE49-F238E27FC236}">
-                <a16:creationId xmlns:a16="http://schemas.microsoft.com/office/drawing/2014/main" id="{6BF36B24-6632-4516-9692-731462896C1F}"/>
+      <p:cxnSp>
+        <p:nvCxnSpPr>
+          <p:cNvPr id="89" name="Straight Connector 88">
+            <a:extLst>
+              <a:ext uri="{FF2B5EF4-FFF2-40B4-BE49-F238E27FC236}">
+                <a16:creationId xmlns:a16="http://schemas.microsoft.com/office/drawing/2014/main" id="{7855A9B5-1710-4B19-B0F1-CDFDD4ED5B7E}"/>
+              </a:ext>
+              <a:ext uri="{C183D7F6-B498-43B3-948B-1728B52AA6E4}">
+                <adec:decorative xmlns:adec="http://schemas.microsoft.com/office/drawing/2017/decorative" val="1"/>
+              </a:ext>
+            </a:extLst>
+          </p:cNvPr>
+          <p:cNvCxnSpPr>
+            <a:cxnSpLocks noGrp="1" noRot="1" noChangeAspect="1" noMove="1" noResize="1" noEditPoints="1" noAdjustHandles="1" noChangeArrowheads="1" noChangeShapeType="1"/>
+          </p:cNvCxnSpPr>
+          <p:nvPr>
+            <p:extLst>
+              <p:ext uri="{386F3935-93C4-4BCD-93E2-E3B085C9AB24}">
+                <p16:designElem xmlns:p16="http://schemas.microsoft.com/office/powerpoint/2015/main" val="1"/>
+              </p:ext>
+            </p:extLst>
+          </p:nvPr>
+        </p:nvCxnSpPr>
+        <p:spPr>
+          <a:xfrm>
+            <a:off x="6514044" y="2246569"/>
+            <a:ext cx="4572000" cy="0"/>
+          </a:xfrm>
+          <a:prstGeom prst="line">
+            <a:avLst/>
+          </a:prstGeom>
+          <a:ln w="12700">
+            <a:solidFill>
+              <a:schemeClr val="tx1">
+                <a:lumMod val="75000"/>
+                <a:lumOff val="25000"/>
+              </a:schemeClr>
+            </a:solidFill>
+          </a:ln>
+        </p:spPr>
+        <p:style>
+          <a:lnRef idx="1">
+            <a:schemeClr val="accent1"/>
+          </a:lnRef>
+          <a:fillRef idx="0">
+            <a:schemeClr val="accent1"/>
+          </a:fillRef>
+          <a:effectRef idx="0">
+            <a:schemeClr val="accent1"/>
+          </a:effectRef>
+          <a:fontRef idx="minor">
+            <a:schemeClr val="tx1"/>
+          </a:fontRef>
+        </p:style>
+      </p:cxnSp>
+      <p:sp>
+        <p:nvSpPr>
+          <p:cNvPr id="3" name="Content Placeholder 2">
+            <a:extLst>
+              <a:ext uri="{FF2B5EF4-FFF2-40B4-BE49-F238E27FC236}">
+                <a16:creationId xmlns:a16="http://schemas.microsoft.com/office/drawing/2014/main" id="{6311D31F-A605-BD54-9B7F-357428D58B88}"/>
+              </a:ext>
+            </a:extLst>
+          </p:cNvPr>
+          <p:cNvSpPr>
+            <a:spLocks noGrp="1"/>
+          </p:cNvSpPr>
+          <p:nvPr>
+            <p:ph idx="1"/>
+          </p:nvPr>
+        </p:nvSpPr>
+        <p:spPr>
+          <a:xfrm>
+            <a:off x="6411684" y="2407436"/>
+            <a:ext cx="5127172" cy="3461658"/>
+          </a:xfrm>
+        </p:spPr>
+        <p:txBody>
+          <a:bodyPr>
+            <a:normAutofit/>
+          </a:bodyPr>
+          <a:lstStyle/>
+          <a:p>
+            <a:pPr marL="0" indent="0">
+              <a:buNone/>
+            </a:pPr>
+            <a:r>
+              <a:rPr lang="en-GB" dirty="0"/>
+              <a:t>If interested, users can click on the car for more </a:t>
+            </a:r>
+            <a:r>
+              <a:rPr lang="en-GB" b="1" dirty="0"/>
+              <a:t>details</a:t>
+            </a:r>
+            <a:r>
+              <a:rPr lang="en-GB" dirty="0"/>
+              <a:t>.</a:t>
+            </a:r>
+          </a:p>
+          <a:p>
+            <a:pPr marL="0" indent="0">
+              <a:buNone/>
+            </a:pPr>
+            <a:r>
+              <a:rPr lang="en-GB" dirty="0"/>
+              <a:t>From there, the car can be added to a Wishlist, or the user can complete a form of interest to contact the seller</a:t>
+            </a:r>
+          </a:p>
+          <a:p>
+            <a:pPr>
+              <a:buFont typeface="Wingdings" panose="05000000000000000000" pitchFamily="2" charset="2"/>
+              <a:buChar char="v"/>
+            </a:pPr>
+            <a:endParaRPr lang="en-GB" dirty="0"/>
+          </a:p>
+        </p:txBody>
+      </p:sp>
+      <p:sp>
+        <p:nvSpPr>
+          <p:cNvPr id="91" name="Rectangle 90">
+            <a:extLst>
+              <a:ext uri="{FF2B5EF4-FFF2-40B4-BE49-F238E27FC236}">
+                <a16:creationId xmlns:a16="http://schemas.microsoft.com/office/drawing/2014/main" id="{9AA76026-5689-4584-8D93-D71D739E61B5}"/>
               </a:ext>
               <a:ext uri="{C183D7F6-B498-43B3-948B-1728B52AA6E4}">
                 <adec:decorative xmlns:adec="http://schemas.microsoft.com/office/drawing/2017/decorative" val="1"/>
@@ -6236,6 +8852,984 @@
     <p:extLst>
       <p:ext uri="{BB962C8B-B14F-4D97-AF65-F5344CB8AC3E}">
         <p14:creationId xmlns:p14="http://schemas.microsoft.com/office/powerpoint/2010/main" val="323038569"/>
+      </p:ext>
+    </p:extLst>
+  </p:cSld>
+  <p:clrMapOvr>
+    <a:masterClrMapping/>
+  </p:clrMapOvr>
+</p:sld>
+</file>
+
+<file path=ppt/slides/slide7.xml><?xml version="1.0" encoding="utf-8"?>
+<p:sld xmlns:a="http://schemas.openxmlformats.org/drawingml/2006/main" xmlns:r="http://schemas.openxmlformats.org/officeDocument/2006/relationships" xmlns:p="http://schemas.openxmlformats.org/presentationml/2006/main">
+  <p:cSld>
+    <p:bg>
+      <p:bgPr>
+        <a:solidFill>
+          <a:schemeClr val="bg1">
+            <a:lumMod val="95000"/>
+          </a:schemeClr>
+        </a:solidFill>
+        <a:effectLst/>
+      </p:bgPr>
+    </p:bg>
+    <p:spTree>
+      <p:nvGrpSpPr>
+        <p:cNvPr id="1" name=""/>
+        <p:cNvGrpSpPr/>
+        <p:nvPr/>
+      </p:nvGrpSpPr>
+      <p:grpSpPr>
+        <a:xfrm>
+          <a:off x="0" y="0"/>
+          <a:ext cx="0" cy="0"/>
+          <a:chOff x="0" y="0"/>
+          <a:chExt cx="0" cy="0"/>
+        </a:xfrm>
+      </p:grpSpPr>
+      <p:sp useBgFill="1">
+        <p:nvSpPr>
+          <p:cNvPr id="78" name="Rectangle 77">
+            <a:extLst>
+              <a:ext uri="{FF2B5EF4-FFF2-40B4-BE49-F238E27FC236}">
+                <a16:creationId xmlns:a16="http://schemas.microsoft.com/office/drawing/2014/main" id="{80861964-D86C-4A50-8F6D-B466384A61B1}"/>
+              </a:ext>
+              <a:ext uri="{C183D7F6-B498-43B3-948B-1728B52AA6E4}">
+                <adec:decorative xmlns:adec="http://schemas.microsoft.com/office/drawing/2017/decorative" val="1"/>
+              </a:ext>
+            </a:extLst>
+          </p:cNvPr>
+          <p:cNvSpPr>
+            <a:spLocks noGrp="1" noRot="1" noChangeAspect="1" noMove="1" noResize="1" noEditPoints="1" noAdjustHandles="1" noChangeArrowheads="1" noChangeShapeType="1" noTextEdit="1"/>
+          </p:cNvSpPr>
+          <p:nvPr>
+            <p:extLst>
+              <p:ext uri="{386F3935-93C4-4BCD-93E2-E3B085C9AB24}">
+                <p16:designElem xmlns:p16="http://schemas.microsoft.com/office/powerpoint/2015/main" val="1"/>
+              </p:ext>
+            </p:extLst>
+          </p:nvPr>
+        </p:nvSpPr>
+        <p:spPr>
+          <a:xfrm>
+            <a:off x="0" y="0"/>
+            <a:ext cx="12192001" cy="6858000"/>
+          </a:xfrm>
+          <a:prstGeom prst="rect">
+            <a:avLst/>
+          </a:prstGeom>
+          <a:ln>
+            <a:noFill/>
+          </a:ln>
+        </p:spPr>
+        <p:style>
+          <a:lnRef idx="2">
+            <a:schemeClr val="accent1">
+              <a:shade val="50000"/>
+            </a:schemeClr>
+          </a:lnRef>
+          <a:fillRef idx="1">
+            <a:schemeClr val="accent1"/>
+          </a:fillRef>
+          <a:effectRef idx="0">
+            <a:schemeClr val="accent1"/>
+          </a:effectRef>
+          <a:fontRef idx="minor">
+            <a:schemeClr val="lt1"/>
+          </a:fontRef>
+        </p:style>
+        <p:txBody>
+          <a:bodyPr rtlCol="0" anchor="ctr"/>
+          <a:lstStyle/>
+          <a:p>
+            <a:pPr algn="ctr"/>
+            <a:endParaRPr lang="en-US"/>
+          </a:p>
+        </p:txBody>
+      </p:sp>
+      <p:sp>
+        <p:nvSpPr>
+          <p:cNvPr id="2" name="Title 1">
+            <a:extLst>
+              <a:ext uri="{FF2B5EF4-FFF2-40B4-BE49-F238E27FC236}">
+                <a16:creationId xmlns:a16="http://schemas.microsoft.com/office/drawing/2014/main" id="{2B44E995-5C74-F080-87CB-013DF8B69CD8}"/>
+              </a:ext>
+            </a:extLst>
+          </p:cNvPr>
+          <p:cNvSpPr>
+            <a:spLocks noGrp="1"/>
+          </p:cNvSpPr>
+          <p:nvPr>
+            <p:ph type="title"/>
+          </p:nvPr>
+        </p:nvSpPr>
+        <p:spPr>
+          <a:xfrm>
+            <a:off x="7859485" y="634946"/>
+            <a:ext cx="3690257" cy="1450757"/>
+          </a:xfrm>
+        </p:spPr>
+        <p:txBody>
+          <a:bodyPr>
+            <a:normAutofit/>
+          </a:bodyPr>
+          <a:lstStyle/>
+          <a:p>
+            <a:r>
+              <a:rPr lang="en-GB" dirty="0"/>
+              <a:t>Contact Form</a:t>
+            </a:r>
+            <a:endParaRPr lang="en-CY" dirty="0"/>
+          </a:p>
+        </p:txBody>
+      </p:sp>
+      <p:pic>
+        <p:nvPicPr>
+          <p:cNvPr id="6" name="Picture 5">
+            <a:extLst>
+              <a:ext uri="{FF2B5EF4-FFF2-40B4-BE49-F238E27FC236}">
+                <a16:creationId xmlns:a16="http://schemas.microsoft.com/office/drawing/2014/main" id="{2CEFFA4E-D604-7F67-02AE-3505935AA592}"/>
+              </a:ext>
+            </a:extLst>
+          </p:cNvPr>
+          <p:cNvPicPr>
+            <a:picLocks noChangeAspect="1"/>
+          </p:cNvPicPr>
+          <p:nvPr/>
+        </p:nvPicPr>
+        <p:blipFill>
+          <a:blip r:embed="rId3"/>
+          <a:stretch>
+            <a:fillRect/>
+          </a:stretch>
+        </p:blipFill>
+        <p:spPr>
+          <a:xfrm>
+            <a:off x="1135899" y="640081"/>
+            <a:ext cx="5579427" cy="5314406"/>
+          </a:xfrm>
+          <a:prstGeom prst="rect">
+            <a:avLst/>
+          </a:prstGeom>
+        </p:spPr>
+      </p:pic>
+      <p:cxnSp>
+        <p:nvCxnSpPr>
+          <p:cNvPr id="80" name="Straight Connector 79">
+            <a:extLst>
+              <a:ext uri="{FF2B5EF4-FFF2-40B4-BE49-F238E27FC236}">
+                <a16:creationId xmlns:a16="http://schemas.microsoft.com/office/drawing/2014/main" id="{754A678E-8F30-4E92-A5BF-F5D03D011394}"/>
+              </a:ext>
+              <a:ext uri="{C183D7F6-B498-43B3-948B-1728B52AA6E4}">
+                <adec:decorative xmlns:adec="http://schemas.microsoft.com/office/drawing/2017/decorative" val="1"/>
+              </a:ext>
+            </a:extLst>
+          </p:cNvPr>
+          <p:cNvCxnSpPr>
+            <a:cxnSpLocks noGrp="1" noRot="1" noChangeAspect="1" noMove="1" noResize="1" noEditPoints="1" noAdjustHandles="1" noChangeArrowheads="1" noChangeShapeType="1"/>
+          </p:cNvCxnSpPr>
+          <p:nvPr>
+            <p:extLst>
+              <p:ext uri="{386F3935-93C4-4BCD-93E2-E3B085C9AB24}">
+                <p16:designElem xmlns:p16="http://schemas.microsoft.com/office/powerpoint/2015/main" val="1"/>
+              </p:ext>
+            </p:extLst>
+          </p:nvPr>
+        </p:nvCxnSpPr>
+        <p:spPr>
+          <a:xfrm>
+            <a:off x="7898967" y="2246569"/>
+            <a:ext cx="3474720" cy="0"/>
+          </a:xfrm>
+          <a:prstGeom prst="line">
+            <a:avLst/>
+          </a:prstGeom>
+          <a:ln w="12700">
+            <a:solidFill>
+              <a:schemeClr val="tx1">
+                <a:lumMod val="75000"/>
+                <a:lumOff val="25000"/>
+              </a:schemeClr>
+            </a:solidFill>
+          </a:ln>
+        </p:spPr>
+        <p:style>
+          <a:lnRef idx="1">
+            <a:schemeClr val="accent1"/>
+          </a:lnRef>
+          <a:fillRef idx="0">
+            <a:schemeClr val="accent1"/>
+          </a:fillRef>
+          <a:effectRef idx="0">
+            <a:schemeClr val="accent1"/>
+          </a:effectRef>
+          <a:fontRef idx="minor">
+            <a:schemeClr val="tx1"/>
+          </a:fontRef>
+        </p:style>
+      </p:cxnSp>
+      <p:sp>
+        <p:nvSpPr>
+          <p:cNvPr id="3" name="Content Placeholder 2">
+            <a:extLst>
+              <a:ext uri="{FF2B5EF4-FFF2-40B4-BE49-F238E27FC236}">
+                <a16:creationId xmlns:a16="http://schemas.microsoft.com/office/drawing/2014/main" id="{6311D31F-A605-BD54-9B7F-357428D58B88}"/>
+              </a:ext>
+            </a:extLst>
+          </p:cNvPr>
+          <p:cNvSpPr>
+            <a:spLocks noGrp="1"/>
+          </p:cNvSpPr>
+          <p:nvPr>
+            <p:ph idx="1"/>
+          </p:nvPr>
+        </p:nvSpPr>
+        <p:spPr>
+          <a:xfrm>
+            <a:off x="7859485" y="2407436"/>
+            <a:ext cx="3690257" cy="3461658"/>
+          </a:xfrm>
+        </p:spPr>
+        <p:txBody>
+          <a:bodyPr>
+            <a:normAutofit/>
+          </a:bodyPr>
+          <a:lstStyle/>
+          <a:p>
+            <a:pPr marL="0" indent="0">
+              <a:buNone/>
+            </a:pPr>
+            <a:r>
+              <a:rPr lang="en-GB" dirty="0"/>
+              <a:t>The user can fill out their details to </a:t>
+            </a:r>
+            <a:r>
+              <a:rPr lang="en-GB" b="1" dirty="0"/>
+              <a:t>enquire</a:t>
+            </a:r>
+            <a:r>
+              <a:rPr lang="en-GB" dirty="0"/>
+              <a:t> about a listing, and add a message that will be sent to the seller’s email address.</a:t>
+            </a:r>
+          </a:p>
+          <a:p>
+            <a:pPr>
+              <a:buFont typeface="Wingdings" panose="05000000000000000000" pitchFamily="2" charset="2"/>
+              <a:buChar char="v"/>
+            </a:pPr>
+            <a:endParaRPr lang="en-GB" dirty="0"/>
+          </a:p>
+        </p:txBody>
+      </p:sp>
+      <p:sp>
+        <p:nvSpPr>
+          <p:cNvPr id="82" name="Rectangle 81">
+            <a:extLst>
+              <a:ext uri="{FF2B5EF4-FFF2-40B4-BE49-F238E27FC236}">
+                <a16:creationId xmlns:a16="http://schemas.microsoft.com/office/drawing/2014/main" id="{F2BDE551-930A-4FE1-8434-09824E3247E6}"/>
+              </a:ext>
+              <a:ext uri="{C183D7F6-B498-43B3-948B-1728B52AA6E4}">
+                <adec:decorative xmlns:adec="http://schemas.microsoft.com/office/drawing/2017/decorative" val="1"/>
+              </a:ext>
+            </a:extLst>
+          </p:cNvPr>
+          <p:cNvSpPr>
+            <a:spLocks noGrp="1" noRot="1" noChangeAspect="1" noMove="1" noResize="1" noEditPoints="1" noAdjustHandles="1" noChangeArrowheads="1" noChangeShapeType="1" noTextEdit="1"/>
+          </p:cNvSpPr>
+          <p:nvPr>
+            <p:extLst>
+              <p:ext uri="{386F3935-93C4-4BCD-93E2-E3B085C9AB24}">
+                <p16:designElem xmlns:p16="http://schemas.microsoft.com/office/powerpoint/2015/main" val="1"/>
+              </p:ext>
+            </p:extLst>
+          </p:nvPr>
+        </p:nvSpPr>
+        <p:spPr>
+          <a:xfrm>
+            <a:off x="0" y="6400800"/>
+            <a:ext cx="12192000" cy="457200"/>
+          </a:xfrm>
+          <a:prstGeom prst="rect">
+            <a:avLst/>
+          </a:prstGeom>
+          <a:solidFill>
+            <a:srgbClr val="262626"/>
+          </a:solidFill>
+          <a:ln>
+            <a:noFill/>
+          </a:ln>
+        </p:spPr>
+        <p:style>
+          <a:lnRef idx="2">
+            <a:schemeClr val="accent1">
+              <a:shade val="50000"/>
+            </a:schemeClr>
+          </a:lnRef>
+          <a:fillRef idx="1">
+            <a:schemeClr val="accent1"/>
+          </a:fillRef>
+          <a:effectRef idx="0">
+            <a:schemeClr val="accent1"/>
+          </a:effectRef>
+          <a:fontRef idx="minor">
+            <a:schemeClr val="lt1"/>
+          </a:fontRef>
+        </p:style>
+      </p:sp>
+    </p:spTree>
+    <p:extLst>
+      <p:ext uri="{BB962C8B-B14F-4D97-AF65-F5344CB8AC3E}">
+        <p14:creationId xmlns:p14="http://schemas.microsoft.com/office/powerpoint/2010/main" val="376075804"/>
+      </p:ext>
+    </p:extLst>
+  </p:cSld>
+  <p:clrMapOvr>
+    <a:masterClrMapping/>
+  </p:clrMapOvr>
+</p:sld>
+</file>
+
+<file path=ppt/slides/slide8.xml><?xml version="1.0" encoding="utf-8"?>
+<p:sld xmlns:a="http://schemas.openxmlformats.org/drawingml/2006/main" xmlns:r="http://schemas.openxmlformats.org/officeDocument/2006/relationships" xmlns:p="http://schemas.openxmlformats.org/presentationml/2006/main">
+  <p:cSld>
+    <p:bg>
+      <p:bgPr>
+        <a:solidFill>
+          <a:schemeClr val="bg1">
+            <a:lumMod val="85000"/>
+            <a:alpha val="20000"/>
+          </a:schemeClr>
+        </a:solidFill>
+        <a:effectLst/>
+      </p:bgPr>
+    </p:bg>
+    <p:spTree>
+      <p:nvGrpSpPr>
+        <p:cNvPr id="1" name=""/>
+        <p:cNvGrpSpPr/>
+        <p:nvPr/>
+      </p:nvGrpSpPr>
+      <p:grpSpPr>
+        <a:xfrm>
+          <a:off x="0" y="0"/>
+          <a:ext cx="0" cy="0"/>
+          <a:chOff x="0" y="0"/>
+          <a:chExt cx="0" cy="0"/>
+        </a:xfrm>
+      </p:grpSpPr>
+      <p:sp useBgFill="1">
+        <p:nvSpPr>
+          <p:cNvPr id="51" name="Rectangle 50">
+            <a:extLst>
+              <a:ext uri="{FF2B5EF4-FFF2-40B4-BE49-F238E27FC236}">
+                <a16:creationId xmlns:a16="http://schemas.microsoft.com/office/drawing/2014/main" id="{13BCCAE5-A35B-4B66-A4A7-E23C34A403A4}"/>
+              </a:ext>
+              <a:ext uri="{C183D7F6-B498-43B3-948B-1728B52AA6E4}">
+                <adec:decorative xmlns:adec="http://schemas.microsoft.com/office/drawing/2017/decorative" val="1"/>
+              </a:ext>
+            </a:extLst>
+          </p:cNvPr>
+          <p:cNvSpPr>
+            <a:spLocks noGrp="1" noRot="1" noChangeAspect="1" noMove="1" noResize="1" noEditPoints="1" noAdjustHandles="1" noChangeArrowheads="1" noChangeShapeType="1" noTextEdit="1"/>
+          </p:cNvSpPr>
+          <p:nvPr>
+            <p:extLst>
+              <p:ext uri="{386F3935-93C4-4BCD-93E2-E3B085C9AB24}">
+                <p16:designElem xmlns:p16="http://schemas.microsoft.com/office/powerpoint/2015/main" val="1"/>
+              </p:ext>
+            </p:extLst>
+          </p:nvPr>
+        </p:nvSpPr>
+        <p:spPr>
+          <a:xfrm>
+            <a:off x="0" y="0"/>
+            <a:ext cx="12192000" cy="6858000"/>
+          </a:xfrm>
+          <a:prstGeom prst="rect">
+            <a:avLst/>
+          </a:prstGeom>
+          <a:ln>
+            <a:noFill/>
+          </a:ln>
+        </p:spPr>
+        <p:style>
+          <a:lnRef idx="2">
+            <a:schemeClr val="accent1">
+              <a:shade val="50000"/>
+            </a:schemeClr>
+          </a:lnRef>
+          <a:fillRef idx="1">
+            <a:schemeClr val="accent1"/>
+          </a:fillRef>
+          <a:effectRef idx="0">
+            <a:schemeClr val="accent1"/>
+          </a:effectRef>
+          <a:fontRef idx="minor">
+            <a:schemeClr val="lt1"/>
+          </a:fontRef>
+        </p:style>
+        <p:txBody>
+          <a:bodyPr rtlCol="0" anchor="ctr"/>
+          <a:lstStyle/>
+          <a:p>
+            <a:pPr algn="ctr"/>
+            <a:endParaRPr lang="en-US"/>
+          </a:p>
+        </p:txBody>
+      </p:sp>
+      <p:sp>
+        <p:nvSpPr>
+          <p:cNvPr id="2" name="Title 1">
+            <a:extLst>
+              <a:ext uri="{FF2B5EF4-FFF2-40B4-BE49-F238E27FC236}">
+                <a16:creationId xmlns:a16="http://schemas.microsoft.com/office/drawing/2014/main" id="{2B44E995-5C74-F080-87CB-013DF8B69CD8}"/>
+              </a:ext>
+            </a:extLst>
+          </p:cNvPr>
+          <p:cNvSpPr>
+            <a:spLocks noGrp="1"/>
+          </p:cNvSpPr>
+          <p:nvPr>
+            <p:ph type="title"/>
+          </p:nvPr>
+        </p:nvSpPr>
+        <p:spPr>
+          <a:xfrm>
+            <a:off x="1036320" y="286603"/>
+            <a:ext cx="10058400" cy="1450757"/>
+          </a:xfrm>
+        </p:spPr>
+        <p:txBody>
+          <a:bodyPr>
+            <a:normAutofit/>
+          </a:bodyPr>
+          <a:lstStyle/>
+          <a:p>
+            <a:r>
+              <a:rPr lang="en-GB" dirty="0"/>
+              <a:t>Wishlist</a:t>
+            </a:r>
+            <a:endParaRPr lang="en-CY" dirty="0"/>
+          </a:p>
+        </p:txBody>
+      </p:sp>
+      <p:cxnSp>
+        <p:nvCxnSpPr>
+          <p:cNvPr id="53" name="Straight Connector 52">
+            <a:extLst>
+              <a:ext uri="{FF2B5EF4-FFF2-40B4-BE49-F238E27FC236}">
+                <a16:creationId xmlns:a16="http://schemas.microsoft.com/office/drawing/2014/main" id="{6987BDFB-DE64-4B56-B44F-45FAE19FA94E}"/>
+              </a:ext>
+              <a:ext uri="{C183D7F6-B498-43B3-948B-1728B52AA6E4}">
+                <adec:decorative xmlns:adec="http://schemas.microsoft.com/office/drawing/2017/decorative" val="1"/>
+              </a:ext>
+            </a:extLst>
+          </p:cNvPr>
+          <p:cNvCxnSpPr>
+            <a:cxnSpLocks noGrp="1" noRot="1" noChangeAspect="1" noMove="1" noResize="1" noEditPoints="1" noAdjustHandles="1" noChangeArrowheads="1" noChangeShapeType="1"/>
+          </p:cNvCxnSpPr>
+          <p:nvPr>
+            <p:extLst>
+              <p:ext uri="{386F3935-93C4-4BCD-93E2-E3B085C9AB24}">
+                <p16:designElem xmlns:p16="http://schemas.microsoft.com/office/powerpoint/2015/main" val="1"/>
+              </p:ext>
+            </p:extLst>
+          </p:nvPr>
+        </p:nvCxnSpPr>
+        <p:spPr>
+          <a:xfrm>
+            <a:off x="1106573" y="1895846"/>
+            <a:ext cx="9784080" cy="0"/>
+          </a:xfrm>
+          <a:prstGeom prst="line">
+            <a:avLst/>
+          </a:prstGeom>
+          <a:ln w="12700">
+            <a:solidFill>
+              <a:schemeClr val="tx1">
+                <a:lumMod val="75000"/>
+                <a:lumOff val="25000"/>
+              </a:schemeClr>
+            </a:solidFill>
+          </a:ln>
+        </p:spPr>
+        <p:style>
+          <a:lnRef idx="1">
+            <a:schemeClr val="accent1"/>
+          </a:lnRef>
+          <a:fillRef idx="0">
+            <a:schemeClr val="accent1"/>
+          </a:fillRef>
+          <a:effectRef idx="0">
+            <a:schemeClr val="accent1"/>
+          </a:effectRef>
+          <a:fontRef idx="minor">
+            <a:schemeClr val="tx1"/>
+          </a:fontRef>
+        </p:style>
+      </p:cxnSp>
+      <p:sp>
+        <p:nvSpPr>
+          <p:cNvPr id="3" name="Content Placeholder 2">
+            <a:extLst>
+              <a:ext uri="{FF2B5EF4-FFF2-40B4-BE49-F238E27FC236}">
+                <a16:creationId xmlns:a16="http://schemas.microsoft.com/office/drawing/2014/main" id="{6311D31F-A605-BD54-9B7F-357428D58B88}"/>
+              </a:ext>
+            </a:extLst>
+          </p:cNvPr>
+          <p:cNvSpPr>
+            <a:spLocks noGrp="1"/>
+          </p:cNvSpPr>
+          <p:nvPr>
+            <p:ph idx="1"/>
+          </p:nvPr>
+        </p:nvSpPr>
+        <p:spPr>
+          <a:xfrm>
+            <a:off x="8545455" y="2511533"/>
+            <a:ext cx="3062873" cy="3568127"/>
+          </a:xfrm>
+        </p:spPr>
+        <p:txBody>
+          <a:bodyPr>
+            <a:normAutofit/>
+          </a:bodyPr>
+          <a:lstStyle/>
+          <a:p>
+            <a:pPr marL="0" indent="0">
+              <a:buNone/>
+            </a:pPr>
+            <a:r>
+              <a:rPr lang="en-GB" sz="2100" dirty="0"/>
+              <a:t>Cars can be added to, or removed from a </a:t>
+            </a:r>
+            <a:r>
+              <a:rPr lang="en-GB" sz="2100" b="1" dirty="0"/>
+              <a:t>Wishlist </a:t>
+            </a:r>
+            <a:r>
+              <a:rPr lang="en-GB" sz="2100" dirty="0"/>
+              <a:t>that is accessible to them later. </a:t>
+            </a:r>
+          </a:p>
+          <a:p>
+            <a:pPr marL="0" indent="0">
+              <a:buNone/>
+            </a:pPr>
+            <a:endParaRPr lang="en-GB" dirty="0"/>
+          </a:p>
+        </p:txBody>
+      </p:sp>
+      <p:sp>
+        <p:nvSpPr>
+          <p:cNvPr id="55" name="Rectangle 54">
+            <a:extLst>
+              <a:ext uri="{FF2B5EF4-FFF2-40B4-BE49-F238E27FC236}">
+                <a16:creationId xmlns:a16="http://schemas.microsoft.com/office/drawing/2014/main" id="{0B2EDFE5-9478-4774-9D3D-FEC7DC7082EF}"/>
+              </a:ext>
+              <a:ext uri="{C183D7F6-B498-43B3-948B-1728B52AA6E4}">
+                <adec:decorative xmlns:adec="http://schemas.microsoft.com/office/drawing/2017/decorative" val="1"/>
+              </a:ext>
+            </a:extLst>
+          </p:cNvPr>
+          <p:cNvSpPr>
+            <a:spLocks noGrp="1" noRot="1" noChangeAspect="1" noMove="1" noResize="1" noEditPoints="1" noAdjustHandles="1" noChangeArrowheads="1" noChangeShapeType="1" noTextEdit="1"/>
+          </p:cNvSpPr>
+          <p:nvPr>
+            <p:extLst>
+              <p:ext uri="{386F3935-93C4-4BCD-93E2-E3B085C9AB24}">
+                <p16:designElem xmlns:p16="http://schemas.microsoft.com/office/powerpoint/2015/main" val="1"/>
+              </p:ext>
+            </p:extLst>
+          </p:nvPr>
+        </p:nvSpPr>
+        <p:spPr>
+          <a:xfrm>
+            <a:off x="0" y="6400800"/>
+            <a:ext cx="12192000" cy="457200"/>
+          </a:xfrm>
+          <a:prstGeom prst="rect">
+            <a:avLst/>
+          </a:prstGeom>
+          <a:solidFill>
+            <a:srgbClr val="262626"/>
+          </a:solidFill>
+          <a:ln>
+            <a:noFill/>
+          </a:ln>
+        </p:spPr>
+        <p:style>
+          <a:lnRef idx="2">
+            <a:schemeClr val="accent1">
+              <a:shade val="50000"/>
+            </a:schemeClr>
+          </a:lnRef>
+          <a:fillRef idx="1">
+            <a:schemeClr val="accent1"/>
+          </a:fillRef>
+          <a:effectRef idx="0">
+            <a:schemeClr val="accent1"/>
+          </a:effectRef>
+          <a:fontRef idx="minor">
+            <a:schemeClr val="lt1"/>
+          </a:fontRef>
+        </p:style>
+      </p:sp>
+      <p:pic>
+        <p:nvPicPr>
+          <p:cNvPr id="5" name="Picture 4">
+            <a:extLst>
+              <a:ext uri="{FF2B5EF4-FFF2-40B4-BE49-F238E27FC236}">
+                <a16:creationId xmlns:a16="http://schemas.microsoft.com/office/drawing/2014/main" id="{49C261C6-523B-9668-4818-413C5563CF62}"/>
+              </a:ext>
+            </a:extLst>
+          </p:cNvPr>
+          <p:cNvPicPr>
+            <a:picLocks noChangeAspect="1"/>
+          </p:cNvPicPr>
+          <p:nvPr/>
+        </p:nvPicPr>
+        <p:blipFill>
+          <a:blip r:embed="rId3"/>
+          <a:stretch>
+            <a:fillRect/>
+          </a:stretch>
+        </p:blipFill>
+        <p:spPr>
+          <a:xfrm>
+            <a:off x="583672" y="2311471"/>
+            <a:ext cx="7690481" cy="3356731"/>
+          </a:xfrm>
+          <a:prstGeom prst="rect">
+            <a:avLst/>
+          </a:prstGeom>
+        </p:spPr>
+      </p:pic>
+    </p:spTree>
+    <p:extLst>
+      <p:ext uri="{BB962C8B-B14F-4D97-AF65-F5344CB8AC3E}">
+        <p14:creationId xmlns:p14="http://schemas.microsoft.com/office/powerpoint/2010/main" val="2364454479"/>
+      </p:ext>
+    </p:extLst>
+  </p:cSld>
+  <p:clrMapOvr>
+    <a:masterClrMapping/>
+  </p:clrMapOvr>
+</p:sld>
+</file>
+
+<file path=ppt/slides/slide9.xml><?xml version="1.0" encoding="utf-8"?>
+<p:sld xmlns:a="http://schemas.openxmlformats.org/drawingml/2006/main" xmlns:r="http://schemas.openxmlformats.org/officeDocument/2006/relationships" xmlns:p="http://schemas.openxmlformats.org/presentationml/2006/main">
+  <p:cSld>
+    <p:bg>
+      <p:bgPr>
+        <a:solidFill>
+          <a:schemeClr val="bg1">
+            <a:lumMod val="95000"/>
+          </a:schemeClr>
+        </a:solidFill>
+        <a:effectLst/>
+      </p:bgPr>
+    </p:bg>
+    <p:spTree>
+      <p:nvGrpSpPr>
+        <p:cNvPr id="1" name=""/>
+        <p:cNvGrpSpPr/>
+        <p:nvPr/>
+      </p:nvGrpSpPr>
+      <p:grpSpPr>
+        <a:xfrm>
+          <a:off x="0" y="0"/>
+          <a:ext cx="0" cy="0"/>
+          <a:chOff x="0" y="0"/>
+          <a:chExt cx="0" cy="0"/>
+        </a:xfrm>
+      </p:grpSpPr>
+      <p:sp useBgFill="1">
+        <p:nvSpPr>
+          <p:cNvPr id="51" name="Rectangle 50">
+            <a:extLst>
+              <a:ext uri="{FF2B5EF4-FFF2-40B4-BE49-F238E27FC236}">
+                <a16:creationId xmlns:a16="http://schemas.microsoft.com/office/drawing/2014/main" id="{13BCCAE5-A35B-4B66-A4A7-E23C34A403A4}"/>
+              </a:ext>
+              <a:ext uri="{C183D7F6-B498-43B3-948B-1728B52AA6E4}">
+                <adec:decorative xmlns:adec="http://schemas.microsoft.com/office/drawing/2017/decorative" val="1"/>
+              </a:ext>
+            </a:extLst>
+          </p:cNvPr>
+          <p:cNvSpPr>
+            <a:spLocks noGrp="1" noRot="1" noChangeAspect="1" noMove="1" noResize="1" noEditPoints="1" noAdjustHandles="1" noChangeArrowheads="1" noChangeShapeType="1" noTextEdit="1"/>
+          </p:cNvSpPr>
+          <p:nvPr>
+            <p:extLst>
+              <p:ext uri="{386F3935-93C4-4BCD-93E2-E3B085C9AB24}">
+                <p16:designElem xmlns:p16="http://schemas.microsoft.com/office/powerpoint/2015/main" val="1"/>
+              </p:ext>
+            </p:extLst>
+          </p:nvPr>
+        </p:nvSpPr>
+        <p:spPr>
+          <a:xfrm>
+            <a:off x="0" y="0"/>
+            <a:ext cx="12192000" cy="6858000"/>
+          </a:xfrm>
+          <a:prstGeom prst="rect">
+            <a:avLst/>
+          </a:prstGeom>
+          <a:ln>
+            <a:noFill/>
+          </a:ln>
+        </p:spPr>
+        <p:style>
+          <a:lnRef idx="2">
+            <a:schemeClr val="accent1">
+              <a:shade val="50000"/>
+            </a:schemeClr>
+          </a:lnRef>
+          <a:fillRef idx="1">
+            <a:schemeClr val="accent1"/>
+          </a:fillRef>
+          <a:effectRef idx="0">
+            <a:schemeClr val="accent1"/>
+          </a:effectRef>
+          <a:fontRef idx="minor">
+            <a:schemeClr val="lt1"/>
+          </a:fontRef>
+        </p:style>
+        <p:txBody>
+          <a:bodyPr rtlCol="0" anchor="ctr"/>
+          <a:lstStyle/>
+          <a:p>
+            <a:pPr algn="ctr"/>
+            <a:endParaRPr lang="en-US"/>
+          </a:p>
+        </p:txBody>
+      </p:sp>
+      <p:sp>
+        <p:nvSpPr>
+          <p:cNvPr id="2" name="Title 1">
+            <a:extLst>
+              <a:ext uri="{FF2B5EF4-FFF2-40B4-BE49-F238E27FC236}">
+                <a16:creationId xmlns:a16="http://schemas.microsoft.com/office/drawing/2014/main" id="{2B44E995-5C74-F080-87CB-013DF8B69CD8}"/>
+              </a:ext>
+            </a:extLst>
+          </p:cNvPr>
+          <p:cNvSpPr>
+            <a:spLocks noGrp="1"/>
+          </p:cNvSpPr>
+          <p:nvPr>
+            <p:ph type="title"/>
+          </p:nvPr>
+        </p:nvSpPr>
+        <p:spPr>
+          <a:xfrm>
+            <a:off x="1036320" y="286603"/>
+            <a:ext cx="10058400" cy="1450757"/>
+          </a:xfrm>
+        </p:spPr>
+        <p:txBody>
+          <a:bodyPr>
+            <a:normAutofit/>
+          </a:bodyPr>
+          <a:lstStyle/>
+          <a:p>
+            <a:r>
+              <a:rPr lang="en-GB" dirty="0"/>
+              <a:t>Manage your listings</a:t>
+            </a:r>
+            <a:endParaRPr lang="en-CY" dirty="0"/>
+          </a:p>
+        </p:txBody>
+      </p:sp>
+      <p:cxnSp>
+        <p:nvCxnSpPr>
+          <p:cNvPr id="53" name="Straight Connector 52">
+            <a:extLst>
+              <a:ext uri="{FF2B5EF4-FFF2-40B4-BE49-F238E27FC236}">
+                <a16:creationId xmlns:a16="http://schemas.microsoft.com/office/drawing/2014/main" id="{6987BDFB-DE64-4B56-B44F-45FAE19FA94E}"/>
+              </a:ext>
+              <a:ext uri="{C183D7F6-B498-43B3-948B-1728B52AA6E4}">
+                <adec:decorative xmlns:adec="http://schemas.microsoft.com/office/drawing/2017/decorative" val="1"/>
+              </a:ext>
+            </a:extLst>
+          </p:cNvPr>
+          <p:cNvCxnSpPr>
+            <a:cxnSpLocks noGrp="1" noRot="1" noChangeAspect="1" noMove="1" noResize="1" noEditPoints="1" noAdjustHandles="1" noChangeArrowheads="1" noChangeShapeType="1"/>
+          </p:cNvCxnSpPr>
+          <p:nvPr>
+            <p:extLst>
+              <p:ext uri="{386F3935-93C4-4BCD-93E2-E3B085C9AB24}">
+                <p16:designElem xmlns:p16="http://schemas.microsoft.com/office/powerpoint/2015/main" val="1"/>
+              </p:ext>
+            </p:extLst>
+          </p:nvPr>
+        </p:nvCxnSpPr>
+        <p:spPr>
+          <a:xfrm>
+            <a:off x="1106573" y="1895846"/>
+            <a:ext cx="9784080" cy="0"/>
+          </a:xfrm>
+          <a:prstGeom prst="line">
+            <a:avLst/>
+          </a:prstGeom>
+          <a:ln w="12700">
+            <a:solidFill>
+              <a:schemeClr val="tx1">
+                <a:lumMod val="75000"/>
+                <a:lumOff val="25000"/>
+              </a:schemeClr>
+            </a:solidFill>
+          </a:ln>
+        </p:spPr>
+        <p:style>
+          <a:lnRef idx="1">
+            <a:schemeClr val="accent1"/>
+          </a:lnRef>
+          <a:fillRef idx="0">
+            <a:schemeClr val="accent1"/>
+          </a:fillRef>
+          <a:effectRef idx="0">
+            <a:schemeClr val="accent1"/>
+          </a:effectRef>
+          <a:fontRef idx="minor">
+            <a:schemeClr val="tx1"/>
+          </a:fontRef>
+        </p:style>
+      </p:cxnSp>
+      <p:sp>
+        <p:nvSpPr>
+          <p:cNvPr id="3" name="Content Placeholder 2">
+            <a:extLst>
+              <a:ext uri="{FF2B5EF4-FFF2-40B4-BE49-F238E27FC236}">
+                <a16:creationId xmlns:a16="http://schemas.microsoft.com/office/drawing/2014/main" id="{6311D31F-A605-BD54-9B7F-357428D58B88}"/>
+              </a:ext>
+            </a:extLst>
+          </p:cNvPr>
+          <p:cNvSpPr>
+            <a:spLocks noGrp="1"/>
+          </p:cNvSpPr>
+          <p:nvPr>
+            <p:ph idx="1"/>
+          </p:nvPr>
+        </p:nvSpPr>
+        <p:spPr>
+          <a:xfrm>
+            <a:off x="8545455" y="2511533"/>
+            <a:ext cx="3062873" cy="3568127"/>
+          </a:xfrm>
+        </p:spPr>
+        <p:txBody>
+          <a:bodyPr>
+            <a:normAutofit/>
+          </a:bodyPr>
+          <a:lstStyle/>
+          <a:p>
+            <a:pPr marL="0" indent="0">
+              <a:buNone/>
+            </a:pPr>
+            <a:r>
+              <a:rPr lang="en-GB" sz="2100" dirty="0"/>
+              <a:t>Through the bar on the top left, the user can view all of their listings, and take them down if needed.</a:t>
+            </a:r>
+          </a:p>
+          <a:p>
+            <a:pPr marL="0" indent="0">
+              <a:buNone/>
+            </a:pPr>
+            <a:endParaRPr lang="en-GB" dirty="0"/>
+          </a:p>
+        </p:txBody>
+      </p:sp>
+      <p:sp>
+        <p:nvSpPr>
+          <p:cNvPr id="55" name="Rectangle 54">
+            <a:extLst>
+              <a:ext uri="{FF2B5EF4-FFF2-40B4-BE49-F238E27FC236}">
+                <a16:creationId xmlns:a16="http://schemas.microsoft.com/office/drawing/2014/main" id="{0B2EDFE5-9478-4774-9D3D-FEC7DC7082EF}"/>
+              </a:ext>
+              <a:ext uri="{C183D7F6-B498-43B3-948B-1728B52AA6E4}">
+                <adec:decorative xmlns:adec="http://schemas.microsoft.com/office/drawing/2017/decorative" val="1"/>
+              </a:ext>
+            </a:extLst>
+          </p:cNvPr>
+          <p:cNvSpPr>
+            <a:spLocks noGrp="1" noRot="1" noChangeAspect="1" noMove="1" noResize="1" noEditPoints="1" noAdjustHandles="1" noChangeArrowheads="1" noChangeShapeType="1" noTextEdit="1"/>
+          </p:cNvSpPr>
+          <p:nvPr>
+            <p:extLst>
+              <p:ext uri="{386F3935-93C4-4BCD-93E2-E3B085C9AB24}">
+                <p16:designElem xmlns:p16="http://schemas.microsoft.com/office/powerpoint/2015/main" val="1"/>
+              </p:ext>
+            </p:extLst>
+          </p:nvPr>
+        </p:nvSpPr>
+        <p:spPr>
+          <a:xfrm>
+            <a:off x="0" y="6400800"/>
+            <a:ext cx="12192000" cy="457200"/>
+          </a:xfrm>
+          <a:prstGeom prst="rect">
+            <a:avLst/>
+          </a:prstGeom>
+          <a:solidFill>
+            <a:srgbClr val="262626"/>
+          </a:solidFill>
+          <a:ln>
+            <a:noFill/>
+          </a:ln>
+        </p:spPr>
+        <p:style>
+          <a:lnRef idx="2">
+            <a:schemeClr val="accent1">
+              <a:shade val="50000"/>
+            </a:schemeClr>
+          </a:lnRef>
+          <a:fillRef idx="1">
+            <a:schemeClr val="accent1"/>
+          </a:fillRef>
+          <a:effectRef idx="0">
+            <a:schemeClr val="accent1"/>
+          </a:effectRef>
+          <a:fontRef idx="minor">
+            <a:schemeClr val="lt1"/>
+          </a:fontRef>
+        </p:style>
+      </p:sp>
+      <p:pic>
+        <p:nvPicPr>
+          <p:cNvPr id="8" name="Picture 7">
+            <a:extLst>
+              <a:ext uri="{FF2B5EF4-FFF2-40B4-BE49-F238E27FC236}">
+                <a16:creationId xmlns:a16="http://schemas.microsoft.com/office/drawing/2014/main" id="{B6DC2BC8-9A3D-CF1A-22FE-7CF444DDF311}"/>
+              </a:ext>
+            </a:extLst>
+          </p:cNvPr>
+          <p:cNvPicPr>
+            <a:picLocks noChangeAspect="1"/>
+          </p:cNvPicPr>
+          <p:nvPr/>
+        </p:nvPicPr>
+        <p:blipFill>
+          <a:blip r:embed="rId3"/>
+          <a:stretch>
+            <a:fillRect/>
+          </a:stretch>
+        </p:blipFill>
+        <p:spPr>
+          <a:xfrm>
+            <a:off x="667756" y="2469297"/>
+            <a:ext cx="7025816" cy="3183860"/>
+          </a:xfrm>
+          <a:prstGeom prst="rect">
+            <a:avLst/>
+          </a:prstGeom>
+        </p:spPr>
+      </p:pic>
+    </p:spTree>
+    <p:extLst>
+      <p:ext uri="{BB962C8B-B14F-4D97-AF65-F5344CB8AC3E}">
+        <p14:creationId xmlns:p14="http://schemas.microsoft.com/office/powerpoint/2010/main" val="3494565309"/>
       </p:ext>
     </p:extLst>
   </p:cSld>

</xml_diff>